<commit_message>
Updated PPT Draft 0.1
</commit_message>
<xml_diff>
--- a/Presentations/Future2DAnim_Tokyo.pptx
+++ b/Presentations/Future2DAnim_Tokyo.pptx
@@ -5,22 +5,23 @@
     <p:sldMasterId id="2147483648" r:id="rId1"/>
   </p:sldMasterIdLst>
   <p:notesMasterIdLst>
-    <p:notesMasterId r:id="rId12"/>
+    <p:notesMasterId r:id="rId13"/>
   </p:notesMasterIdLst>
   <p:handoutMasterIdLst>
-    <p:handoutMasterId r:id="rId13"/>
+    <p:handoutMasterId r:id="rId14"/>
   </p:handoutMasterIdLst>
   <p:sldIdLst>
     <p:sldId id="283" r:id="rId2"/>
     <p:sldId id="256" r:id="rId3"/>
     <p:sldId id="278" r:id="rId4"/>
-    <p:sldId id="280" r:id="rId5"/>
-    <p:sldId id="257" r:id="rId6"/>
-    <p:sldId id="281" r:id="rId7"/>
-    <p:sldId id="264" r:id="rId8"/>
-    <p:sldId id="282" r:id="rId9"/>
-    <p:sldId id="277" r:id="rId10"/>
+    <p:sldId id="257" r:id="rId5"/>
+    <p:sldId id="264" r:id="rId6"/>
+    <p:sldId id="286" r:id="rId7"/>
+    <p:sldId id="287" r:id="rId8"/>
+    <p:sldId id="288" r:id="rId9"/>
+    <p:sldId id="285" r:id="rId10"/>
     <p:sldId id="276" r:id="rId11"/>
+    <p:sldId id="284" r:id="rId12"/>
   </p:sldIdLst>
   <p:sldSz cx="9144000" cy="5143500" type="screen16x9"/>
   <p:notesSz cx="6858000" cy="9144000"/>
@@ -616,7 +617,7 @@
             <a:fld id="{49436F85-577F-4A92-A47F-D540A2BCC821}" type="slidenum">
               <a:rPr lang="en-GB" smtClean="0"/>
               <a:pPr/>
-              <a:t>5</a:t>
+              <a:t>4</a:t>
             </a:fld>
             <a:endParaRPr lang="en-GB" dirty="0"/>
           </a:p>
@@ -701,7 +702,7 @@
             <a:fld id="{49436F85-577F-4A92-A47F-D540A2BCC821}" type="slidenum">
               <a:rPr lang="en-GB" smtClean="0"/>
               <a:pPr/>
-              <a:t>6</a:t>
+              <a:t>5</a:t>
             </a:fld>
             <a:endParaRPr lang="en-GB" dirty="0"/>
           </a:p>
@@ -710,7 +711,7 @@
     </p:spTree>
     <p:extLst>
       <p:ext uri="{BB962C8B-B14F-4D97-AF65-F5344CB8AC3E}">
-        <p14:creationId xmlns:p14="http://schemas.microsoft.com/office/powerpoint/2010/main" val="328901661"/>
+        <p14:creationId xmlns:p14="http://schemas.microsoft.com/office/powerpoint/2010/main" val="3797292388"/>
       </p:ext>
     </p:extLst>
   </p:cSld>
@@ -764,7 +765,7 @@
           <a:bodyPr/>
           <a:lstStyle/>
           <a:p>
-            <a:endParaRPr lang="en-GB"/>
+            <a:endParaRPr lang="en-GB" dirty="0"/>
           </a:p>
         </p:txBody>
       </p:sp>
@@ -786,7 +787,7 @@
             <a:fld id="{49436F85-577F-4A92-A47F-D540A2BCC821}" type="slidenum">
               <a:rPr lang="en-GB" smtClean="0"/>
               <a:pPr/>
-              <a:t>7</a:t>
+              <a:t>6</a:t>
             </a:fld>
             <a:endParaRPr lang="en-GB" dirty="0"/>
           </a:p>
@@ -795,7 +796,7 @@
     </p:spTree>
     <p:extLst>
       <p:ext uri="{BB962C8B-B14F-4D97-AF65-F5344CB8AC3E}">
-        <p14:creationId xmlns:p14="http://schemas.microsoft.com/office/powerpoint/2010/main" val="3797292388"/>
+        <p14:creationId xmlns:p14="http://schemas.microsoft.com/office/powerpoint/2010/main" val="1936601504"/>
       </p:ext>
     </p:extLst>
   </p:cSld>
@@ -849,7 +850,29 @@
           <a:bodyPr/>
           <a:lstStyle/>
           <a:p>
-            <a:endParaRPr lang="en-GB"/>
+            <a:r>
+              <a:rPr lang="en-GB" dirty="0" smtClean="0"/>
+              <a:t>In this part, I will show a demo using Unity (the software)</a:t>
+            </a:r>
+            <a:r>
+              <a:rPr lang="en-GB" baseline="0" dirty="0" smtClean="0"/>
+              <a:t> to Rig, Animate and Move a character using the Anima2D Animation Tool. </a:t>
+            </a:r>
+          </a:p>
+          <a:p>
+            <a:r>
+              <a:rPr lang="en-GB" baseline="0" dirty="0" smtClean="0"/>
+              <a:t>I’m still working on the Assets but, key important things to know are: Bones, Vertices, Attachments, Timeline, </a:t>
+            </a:r>
+            <a:r>
+              <a:rPr lang="en-GB" baseline="0" dirty="0" err="1" smtClean="0"/>
+              <a:t>Dopesheei</a:t>
+            </a:r>
+            <a:r>
+              <a:rPr lang="en-GB" baseline="0" dirty="0" smtClean="0"/>
+              <a:t>, IK, animation curve and interpolation.</a:t>
+            </a:r>
+            <a:endParaRPr lang="en-GB" dirty="0"/>
           </a:p>
         </p:txBody>
       </p:sp>
@@ -871,7 +894,7 @@
             <a:fld id="{49436F85-577F-4A92-A47F-D540A2BCC821}" type="slidenum">
               <a:rPr lang="en-GB" smtClean="0"/>
               <a:pPr/>
-              <a:t>8</a:t>
+              <a:t>7</a:t>
             </a:fld>
             <a:endParaRPr lang="en-GB" dirty="0"/>
           </a:p>
@@ -880,7 +903,7 @@
     </p:spTree>
     <p:extLst>
       <p:ext uri="{BB962C8B-B14F-4D97-AF65-F5344CB8AC3E}">
-        <p14:creationId xmlns:p14="http://schemas.microsoft.com/office/powerpoint/2010/main" val="4020425310"/>
+        <p14:creationId xmlns:p14="http://schemas.microsoft.com/office/powerpoint/2010/main" val="2342777617"/>
       </p:ext>
     </p:extLst>
   </p:cSld>
@@ -934,7 +957,199 @@
           <a:bodyPr/>
           <a:lstStyle/>
           <a:p>
+            <a:r>
+              <a:rPr lang="en-GB" dirty="0" smtClean="0"/>
+              <a:t>Here, I will show videos that</a:t>
+            </a:r>
+            <a:r>
+              <a:rPr lang="en-GB" baseline="0" dirty="0" smtClean="0"/>
+              <a:t> demonstrates the progress of</a:t>
+            </a:r>
+            <a:endParaRPr lang="en-GB" dirty="0"/>
+          </a:p>
+        </p:txBody>
+      </p:sp>
+      <p:sp>
+        <p:nvSpPr>
+          <p:cNvPr id="4" name="Slide Number Placeholder 3"/>
+          <p:cNvSpPr>
+            <a:spLocks noGrp="1"/>
+          </p:cNvSpPr>
+          <p:nvPr>
+            <p:ph type="sldNum" sz="quarter" idx="10"/>
+          </p:nvPr>
+        </p:nvSpPr>
+        <p:spPr/>
+        <p:txBody>
+          <a:bodyPr/>
+          <a:lstStyle/>
+          <a:p>
+            <a:fld id="{49436F85-577F-4A92-A47F-D540A2BCC821}" type="slidenum">
+              <a:rPr lang="en-GB" smtClean="0"/>
+              <a:pPr/>
+              <a:t>8</a:t>
+            </a:fld>
+            <a:endParaRPr lang="en-GB" dirty="0"/>
+          </a:p>
+        </p:txBody>
+      </p:sp>
+    </p:spTree>
+    <p:extLst>
+      <p:ext uri="{BB962C8B-B14F-4D97-AF65-F5344CB8AC3E}">
+        <p14:creationId xmlns:p14="http://schemas.microsoft.com/office/powerpoint/2010/main" val="8296490"/>
+      </p:ext>
+    </p:extLst>
+  </p:cSld>
+  <p:clrMapOvr>
+    <a:masterClrMapping/>
+  </p:clrMapOvr>
+</p:notes>
+</file>
+
+<file path=ppt/notesSlides/notesSlide7.xml><?xml version="1.0" encoding="utf-8"?>
+<p:notes xmlns:a="http://schemas.openxmlformats.org/drawingml/2006/main" xmlns:r="http://schemas.openxmlformats.org/officeDocument/2006/relationships" xmlns:p="http://schemas.openxmlformats.org/presentationml/2006/main">
+  <p:cSld>
+    <p:spTree>
+      <p:nvGrpSpPr>
+        <p:cNvPr id="1" name=""/>
+        <p:cNvGrpSpPr/>
+        <p:nvPr/>
+      </p:nvGrpSpPr>
+      <p:grpSpPr>
+        <a:xfrm>
+          <a:off x="0" y="0"/>
+          <a:ext cx="0" cy="0"/>
+          <a:chOff x="0" y="0"/>
+          <a:chExt cx="0" cy="0"/>
+        </a:xfrm>
+      </p:grpSpPr>
+      <p:sp>
+        <p:nvSpPr>
+          <p:cNvPr id="2" name="Slide Image Placeholder 1"/>
+          <p:cNvSpPr>
+            <a:spLocks noGrp="1" noRot="1" noChangeAspect="1"/>
+          </p:cNvSpPr>
+          <p:nvPr>
+            <p:ph type="sldImg"/>
+          </p:nvPr>
+        </p:nvSpPr>
+        <p:spPr/>
+      </p:sp>
+      <p:sp>
+        <p:nvSpPr>
+          <p:cNvPr id="3" name="Notes Placeholder 2"/>
+          <p:cNvSpPr>
+            <a:spLocks noGrp="1"/>
+          </p:cNvSpPr>
+          <p:nvPr>
+            <p:ph type="body" idx="1"/>
+          </p:nvPr>
+        </p:nvSpPr>
+        <p:spPr/>
+        <p:txBody>
+          <a:bodyPr/>
+          <a:lstStyle/>
+          <a:p>
             <a:endParaRPr lang="en-GB"/>
+          </a:p>
+        </p:txBody>
+      </p:sp>
+      <p:sp>
+        <p:nvSpPr>
+          <p:cNvPr id="4" name="Slide Number Placeholder 3"/>
+          <p:cNvSpPr>
+            <a:spLocks noGrp="1"/>
+          </p:cNvSpPr>
+          <p:nvPr>
+            <p:ph type="sldNum" sz="quarter" idx="10"/>
+          </p:nvPr>
+        </p:nvSpPr>
+        <p:spPr/>
+        <p:txBody>
+          <a:bodyPr/>
+          <a:lstStyle/>
+          <a:p>
+            <a:fld id="{49436F85-577F-4A92-A47F-D540A2BCC821}" type="slidenum">
+              <a:rPr lang="en-GB" smtClean="0"/>
+              <a:pPr/>
+              <a:t>9</a:t>
+            </a:fld>
+            <a:endParaRPr lang="en-GB" dirty="0"/>
+          </a:p>
+        </p:txBody>
+      </p:sp>
+    </p:spTree>
+    <p:extLst>
+      <p:ext uri="{BB962C8B-B14F-4D97-AF65-F5344CB8AC3E}">
+        <p14:creationId xmlns:p14="http://schemas.microsoft.com/office/powerpoint/2010/main" val="3231049928"/>
+      </p:ext>
+    </p:extLst>
+  </p:cSld>
+  <p:clrMapOvr>
+    <a:masterClrMapping/>
+  </p:clrMapOvr>
+</p:notes>
+</file>
+
+<file path=ppt/notesSlides/notesSlide8.xml><?xml version="1.0" encoding="utf-8"?>
+<p:notes xmlns:a="http://schemas.openxmlformats.org/drawingml/2006/main" xmlns:r="http://schemas.openxmlformats.org/officeDocument/2006/relationships" xmlns:p="http://schemas.openxmlformats.org/presentationml/2006/main">
+  <p:cSld>
+    <p:spTree>
+      <p:nvGrpSpPr>
+        <p:cNvPr id="1" name=""/>
+        <p:cNvGrpSpPr/>
+        <p:nvPr/>
+      </p:nvGrpSpPr>
+      <p:grpSpPr>
+        <a:xfrm>
+          <a:off x="0" y="0"/>
+          <a:ext cx="0" cy="0"/>
+          <a:chOff x="0" y="0"/>
+          <a:chExt cx="0" cy="0"/>
+        </a:xfrm>
+      </p:grpSpPr>
+      <p:sp>
+        <p:nvSpPr>
+          <p:cNvPr id="2" name="Slide Image Placeholder 1"/>
+          <p:cNvSpPr>
+            <a:spLocks noGrp="1" noRot="1" noChangeAspect="1"/>
+          </p:cNvSpPr>
+          <p:nvPr>
+            <p:ph type="sldImg"/>
+          </p:nvPr>
+        </p:nvSpPr>
+        <p:spPr/>
+      </p:sp>
+      <p:sp>
+        <p:nvSpPr>
+          <p:cNvPr id="3" name="Notes Placeholder 2"/>
+          <p:cNvSpPr>
+            <a:spLocks noGrp="1"/>
+          </p:cNvSpPr>
+          <p:nvPr>
+            <p:ph type="body" idx="1"/>
+          </p:nvPr>
+        </p:nvSpPr>
+        <p:spPr/>
+        <p:txBody>
+          <a:bodyPr/>
+          <a:lstStyle/>
+          <a:p>
+            <a:r>
+              <a:rPr lang="en-US" dirty="0" smtClean="0"/>
+              <a:t>Q&amp;A</a:t>
+            </a:r>
+            <a:endParaRPr lang="en-US" baseline="0" dirty="0" smtClean="0"/>
+          </a:p>
+          <a:p>
+            <a:endParaRPr lang="en-US" baseline="0" dirty="0" smtClean="0"/>
+          </a:p>
+          <a:p>
+            <a:r>
+              <a:rPr lang="en-US" baseline="0" dirty="0" smtClean="0"/>
+              <a:t>Note for Translator: How do I say Q&amp;A in Japanese?</a:t>
+            </a:r>
+            <a:endParaRPr lang="en-GB" dirty="0"/>
           </a:p>
         </p:txBody>
       </p:sp>
@@ -966,6 +1181,107 @@
     <p:extLst>
       <p:ext uri="{BB962C8B-B14F-4D97-AF65-F5344CB8AC3E}">
         <p14:creationId xmlns:p14="http://schemas.microsoft.com/office/powerpoint/2010/main" val="947654780"/>
+      </p:ext>
+    </p:extLst>
+  </p:cSld>
+  <p:clrMapOvr>
+    <a:masterClrMapping/>
+  </p:clrMapOvr>
+</p:notes>
+</file>
+
+<file path=ppt/notesSlides/notesSlide9.xml><?xml version="1.0" encoding="utf-8"?>
+<p:notes xmlns:a="http://schemas.openxmlformats.org/drawingml/2006/main" xmlns:r="http://schemas.openxmlformats.org/officeDocument/2006/relationships" xmlns:p="http://schemas.openxmlformats.org/presentationml/2006/main">
+  <p:cSld>
+    <p:spTree>
+      <p:nvGrpSpPr>
+        <p:cNvPr id="1" name=""/>
+        <p:cNvGrpSpPr/>
+        <p:nvPr/>
+      </p:nvGrpSpPr>
+      <p:grpSpPr>
+        <a:xfrm>
+          <a:off x="0" y="0"/>
+          <a:ext cx="0" cy="0"/>
+          <a:chOff x="0" y="0"/>
+          <a:chExt cx="0" cy="0"/>
+        </a:xfrm>
+      </p:grpSpPr>
+      <p:sp>
+        <p:nvSpPr>
+          <p:cNvPr id="2" name="Slide Image Placeholder 1"/>
+          <p:cNvSpPr>
+            <a:spLocks noGrp="1" noRot="1" noChangeAspect="1"/>
+          </p:cNvSpPr>
+          <p:nvPr>
+            <p:ph type="sldImg"/>
+          </p:nvPr>
+        </p:nvSpPr>
+        <p:spPr/>
+      </p:sp>
+      <p:sp>
+        <p:nvSpPr>
+          <p:cNvPr id="3" name="Notes Placeholder 2"/>
+          <p:cNvSpPr>
+            <a:spLocks noGrp="1"/>
+          </p:cNvSpPr>
+          <p:nvPr>
+            <p:ph type="body" idx="1"/>
+          </p:nvPr>
+        </p:nvSpPr>
+        <p:spPr/>
+        <p:txBody>
+          <a:bodyPr/>
+          <a:lstStyle/>
+          <a:p>
+            <a:r>
+              <a:rPr lang="en-GB" dirty="0" smtClean="0"/>
+              <a:t>Thank you! </a:t>
+            </a:r>
+            <a:r>
+              <a:rPr lang="ja-JP" altLang="en-US" sz="900" b="1" i="0" kern="1200" dirty="0" smtClean="0">
+                <a:solidFill>
+                  <a:schemeClr val="tx1"/>
+                </a:solidFill>
+                <a:effectLst/>
+                <a:latin typeface="Arial" panose="020B0604020202020204" pitchFamily="34" charset="0"/>
+                <a:ea typeface="+mn-ea"/>
+                <a:cs typeface="+mn-cs"/>
+              </a:rPr>
+              <a:t>ありがとう</a:t>
+            </a:r>
+            <a:endParaRPr lang="en-GB" dirty="0"/>
+          </a:p>
+        </p:txBody>
+      </p:sp>
+      <p:sp>
+        <p:nvSpPr>
+          <p:cNvPr id="4" name="Slide Number Placeholder 3"/>
+          <p:cNvSpPr>
+            <a:spLocks noGrp="1"/>
+          </p:cNvSpPr>
+          <p:nvPr>
+            <p:ph type="sldNum" sz="quarter" idx="10"/>
+          </p:nvPr>
+        </p:nvSpPr>
+        <p:spPr/>
+        <p:txBody>
+          <a:bodyPr/>
+          <a:lstStyle/>
+          <a:p>
+            <a:fld id="{49436F85-577F-4A92-A47F-D540A2BCC821}" type="slidenum">
+              <a:rPr lang="en-GB" smtClean="0"/>
+              <a:pPr/>
+              <a:t>11</a:t>
+            </a:fld>
+            <a:endParaRPr lang="en-GB" dirty="0"/>
+          </a:p>
+        </p:txBody>
+      </p:sp>
+    </p:spTree>
+    <p:extLst>
+      <p:ext uri="{BB962C8B-B14F-4D97-AF65-F5344CB8AC3E}">
+        <p14:creationId xmlns:p14="http://schemas.microsoft.com/office/powerpoint/2010/main" val="1251812793"/>
       </p:ext>
     </p:extLst>
   </p:cSld>
@@ -2754,7 +3070,7 @@
             <a:fld id="{54E0A626-36E7-4ACB-AE94-30B8AB1B2246}" type="datetimeFigureOut">
               <a:rPr lang="en-GB" smtClean="0"/>
               <a:pPr/>
-              <a:t>20/04/2017</a:t>
+              <a:t>25/04/2017</a:t>
             </a:fld>
             <a:endParaRPr lang="en-GB" dirty="0"/>
           </a:p>
@@ -3312,10 +3628,14 @@
           <a:lstStyle/>
           <a:p>
             <a:r>
-              <a:rPr lang="en-GB" dirty="0" smtClean="0"/>
-              <a:t>Thank you!</a:t>
-            </a:r>
-            <a:endParaRPr lang="en-GB" dirty="0"/>
+              <a:rPr lang="en-US" sz="8000" dirty="0" smtClean="0">
+                <a:latin typeface="+mj-lt"/>
+              </a:rPr>
+              <a:t>Q &amp; A</a:t>
+            </a:r>
+            <a:endParaRPr lang="en-GB" sz="8000" dirty="0">
+              <a:latin typeface="+mj-lt"/>
+            </a:endParaRPr>
           </a:p>
         </p:txBody>
       </p:sp>
@@ -3323,6 +3643,74 @@
     <p:extLst>
       <p:ext uri="{BB962C8B-B14F-4D97-AF65-F5344CB8AC3E}">
         <p14:creationId xmlns:p14="http://schemas.microsoft.com/office/powerpoint/2010/main" val="1007421495"/>
+      </p:ext>
+    </p:extLst>
+  </p:cSld>
+  <p:clrMapOvr>
+    <a:masterClrMapping/>
+  </p:clrMapOvr>
+  <mc:AlternateContent xmlns:mc="http://schemas.openxmlformats.org/markup-compatibility/2006" xmlns:p14="http://schemas.microsoft.com/office/powerpoint/2010/main">
+    <mc:Choice Requires="p14">
+      <p:transition spd="slow" p14:dur="2000"/>
+    </mc:Choice>
+    <mc:Fallback xmlns="">
+      <p:transition spd="slow"/>
+    </mc:Fallback>
+  </mc:AlternateContent>
+  <p:timing>
+    <p:tnLst>
+      <p:par>
+        <p:cTn id="1" dur="indefinite" restart="never" nodeType="tmRoot"/>
+      </p:par>
+    </p:tnLst>
+  </p:timing>
+</p:sld>
+</file>
+
+<file path=ppt/slides/slide11.xml><?xml version="1.0" encoding="utf-8"?>
+<p:sld xmlns:a="http://schemas.openxmlformats.org/drawingml/2006/main" xmlns:r="http://schemas.openxmlformats.org/officeDocument/2006/relationships" xmlns:p="http://schemas.openxmlformats.org/presentationml/2006/main">
+  <p:cSld>
+    <p:spTree>
+      <p:nvGrpSpPr>
+        <p:cNvPr id="1" name=""/>
+        <p:cNvGrpSpPr/>
+        <p:nvPr/>
+      </p:nvGrpSpPr>
+      <p:grpSpPr>
+        <a:xfrm>
+          <a:off x="0" y="0"/>
+          <a:ext cx="0" cy="0"/>
+          <a:chOff x="0" y="0"/>
+          <a:chExt cx="0" cy="0"/>
+        </a:xfrm>
+      </p:grpSpPr>
+      <p:sp>
+        <p:nvSpPr>
+          <p:cNvPr id="2" name="Titel 1"/>
+          <p:cNvSpPr>
+            <a:spLocks noGrp="1"/>
+          </p:cNvSpPr>
+          <p:nvPr>
+            <p:ph type="title"/>
+          </p:nvPr>
+        </p:nvSpPr>
+        <p:spPr/>
+        <p:txBody>
+          <a:bodyPr/>
+          <a:lstStyle/>
+          <a:p>
+            <a:r>
+              <a:rPr lang="ja-JP" altLang="en-US" dirty="0"/>
+              <a:t>ありがとう</a:t>
+            </a:r>
+            <a:endParaRPr lang="en-GB" dirty="0"/>
+          </a:p>
+        </p:txBody>
+      </p:sp>
+    </p:spTree>
+    <p:extLst>
+      <p:ext uri="{BB962C8B-B14F-4D97-AF65-F5344CB8AC3E}">
+        <p14:creationId xmlns:p14="http://schemas.microsoft.com/office/powerpoint/2010/main" val="944574657"/>
       </p:ext>
     </p:extLst>
   </p:cSld>
@@ -3422,23 +3810,23 @@
               </a:lnSpc>
             </a:pPr>
             <a:r>
-              <a:rPr lang="en-US" dirty="0" smtClean="0"/>
+              <a:rPr lang="en-US" b="0" dirty="0" smtClean="0"/>
               <a:t>Arturo</a:t>
             </a:r>
             <a:r>
-              <a:rPr lang="da-DK" dirty="0" smtClean="0"/>
+              <a:rPr lang="da-DK" b="0" dirty="0" smtClean="0"/>
               <a:t> </a:t>
             </a:r>
             <a:r>
-              <a:rPr lang="da-DK" dirty="0" err="1" smtClean="0"/>
+              <a:rPr lang="da-DK" b="0" dirty="0" err="1" smtClean="0"/>
               <a:t>Núñez</a:t>
             </a:r>
             <a:r>
-              <a:rPr lang="da-DK" dirty="0" smtClean="0"/>
+              <a:rPr lang="da-DK" b="0" dirty="0" smtClean="0"/>
               <a:t/>
             </a:r>
             <a:br>
-              <a:rPr lang="da-DK" dirty="0" smtClean="0"/>
+              <a:rPr lang="da-DK" b="0" dirty="0" smtClean="0"/>
             </a:br>
             <a:r>
               <a:rPr lang="da-DK" sz="3200" b="0" dirty="0" smtClean="0"/>
@@ -3503,7 +3891,7 @@
       </p:grpSpPr>
       <p:sp>
         <p:nvSpPr>
-          <p:cNvPr id="3" name="Titel 2"/>
+          <p:cNvPr id="2" name="Title 1"/>
           <p:cNvSpPr>
             <a:spLocks noGrp="1"/>
           </p:cNvSpPr>
@@ -3516,60 +3904,28 @@
           <a:bodyPr/>
           <a:lstStyle/>
           <a:p>
-            <a:pPr>
-              <a:lnSpc>
-                <a:spcPts val="4800"/>
-              </a:lnSpc>
-            </a:pPr>
-            <a:r>
-              <a:rPr lang="ja-JP" altLang="en-US" sz="5400" dirty="0" smtClean="0"/>
-              <a:t>講演者名</a:t>
-            </a:r>
-            <a:r>
-              <a:rPr lang="da-DK" altLang="ja-JP" sz="5400" dirty="0"/>
-              <a:t/>
-            </a:r>
-            <a:br>
-              <a:rPr lang="da-DK" altLang="ja-JP" sz="5400" dirty="0"/>
-            </a:br>
-            <a:r>
-              <a:rPr lang="ja-JP" altLang="ja-JP" dirty="0" smtClean="0"/>
-              <a:t>肩書</a:t>
-            </a:r>
-            <a:r>
-              <a:rPr lang="en-US" altLang="ja-JP" dirty="0" smtClean="0"/>
-              <a:t>, </a:t>
-            </a:r>
-            <a:r>
-              <a:rPr lang="ja-JP" altLang="en-US" dirty="0" smtClean="0"/>
-              <a:t>所属団体</a:t>
-            </a:r>
-            <a:r>
-              <a:rPr lang="ja-JP" altLang="ja-JP" dirty="0" smtClean="0"/>
-              <a:t>名</a:t>
-            </a:r>
-            <a:endParaRPr lang="da-DK" sz="3200" b="0" dirty="0"/>
+            <a:r>
+              <a:rPr lang="en-GB" dirty="0" smtClean="0">
+                <a:latin typeface="+mj-lt"/>
+              </a:rPr>
+              <a:t>The Future of 2D Animation in Unity</a:t>
+            </a:r>
+            <a:endParaRPr lang="en-GB" dirty="0">
+              <a:latin typeface="+mj-lt"/>
+            </a:endParaRPr>
           </a:p>
         </p:txBody>
       </p:sp>
     </p:spTree>
     <p:extLst>
       <p:ext uri="{BB962C8B-B14F-4D97-AF65-F5344CB8AC3E}">
-        <p14:creationId xmlns:p14="http://schemas.microsoft.com/office/powerpoint/2010/main" val="2229743437"/>
+        <p14:creationId xmlns:p14="http://schemas.microsoft.com/office/powerpoint/2010/main" val="3529912158"/>
       </p:ext>
     </p:extLst>
   </p:cSld>
   <p:clrMapOvr>
     <a:masterClrMapping/>
   </p:clrMapOvr>
-  <mc:AlternateContent xmlns:mc="http://schemas.openxmlformats.org/markup-compatibility/2006" xmlns:p14="http://schemas.microsoft.com/office/powerpoint/2010/main">
-    <mc:Choice Requires="p14">
-      <p:transition spd="slow" p14:dur="2000"/>
-    </mc:Choice>
-    <mc:Fallback xmlns="">
-      <p:transition spd="slow"/>
-    </mc:Fallback>
-  </mc:AlternateContent>
   <p:timing>
     <p:tnLst>
       <p:par>
@@ -3599,7 +3955,7 @@
       </p:grpSpPr>
       <p:sp>
         <p:nvSpPr>
-          <p:cNvPr id="2" name="Title 1"/>
+          <p:cNvPr id="5" name="Title 4"/>
           <p:cNvSpPr>
             <a:spLocks noGrp="1"/>
           </p:cNvSpPr>
@@ -3614,22 +3970,57 @@
           <a:p>
             <a:r>
               <a:rPr lang="en-GB" dirty="0" smtClean="0"/>
-              <a:t>Key headline text here, and hey, you get to decide the words, but no more than 3 lines, ok?</a:t>
+              <a:t>Headline can go in two lines if necessary and will </a:t>
+            </a:r>
+            <a:r>
+              <a:rPr lang="en-GB" dirty="0" err="1" smtClean="0"/>
+              <a:t>center</a:t>
+            </a:r>
+            <a:r>
+              <a:rPr lang="en-GB" dirty="0" smtClean="0"/>
+              <a:t>-align vertically.</a:t>
             </a:r>
             <a:endParaRPr lang="en-GB" dirty="0"/>
+          </a:p>
+        </p:txBody>
+      </p:sp>
+      <p:sp>
+        <p:nvSpPr>
+          <p:cNvPr id="6" name="Text Placeholder 5"/>
+          <p:cNvSpPr>
+            <a:spLocks noGrp="1"/>
+          </p:cNvSpPr>
+          <p:nvPr>
+            <p:ph type="body" sz="quarter" idx="10"/>
+          </p:nvPr>
+        </p:nvSpPr>
+        <p:spPr/>
+        <p:txBody>
+          <a:bodyPr/>
+          <a:lstStyle/>
+          <a:p>
+            <a:endParaRPr lang="en-GB" dirty="0" smtClean="0"/>
           </a:p>
         </p:txBody>
       </p:sp>
     </p:spTree>
     <p:extLst>
       <p:ext uri="{BB962C8B-B14F-4D97-AF65-F5344CB8AC3E}">
-        <p14:creationId xmlns:p14="http://schemas.microsoft.com/office/powerpoint/2010/main" val="3529912158"/>
+        <p14:creationId xmlns:p14="http://schemas.microsoft.com/office/powerpoint/2010/main" val="157880635"/>
       </p:ext>
     </p:extLst>
   </p:cSld>
   <p:clrMapOvr>
     <a:masterClrMapping/>
   </p:clrMapOvr>
+  <mc:AlternateContent xmlns:mc="http://schemas.openxmlformats.org/markup-compatibility/2006" xmlns:p14="http://schemas.microsoft.com/office/powerpoint/2010/main">
+    <mc:Choice Requires="p14">
+      <p:transition spd="slow" p14:dur="2000"/>
+    </mc:Choice>
+    <mc:Fallback xmlns="">
+      <p:transition spd="slow"/>
+    </mc:Fallback>
+  </mc:AlternateContent>
   <p:timing>
     <p:tnLst>
       <p:par>
@@ -3659,7 +4050,7 @@
       </p:grpSpPr>
       <p:sp>
         <p:nvSpPr>
-          <p:cNvPr id="2" name="Title 1"/>
+          <p:cNvPr id="5" name="Title 4"/>
           <p:cNvSpPr>
             <a:spLocks noGrp="1"/>
           </p:cNvSpPr>
@@ -3673,39 +4064,93 @@
           <a:lstStyle/>
           <a:p>
             <a:r>
-              <a:rPr lang="ja-JP" altLang="ja-JP" dirty="0"/>
-              <a:t>講演タイトル</a:t>
-            </a:r>
-            <a:r>
-              <a:rPr lang="en-US" altLang="ja-JP" dirty="0"/>
-              <a:t>(3</a:t>
-            </a:r>
-            <a:r>
-              <a:rPr lang="ja-JP" altLang="ja-JP" dirty="0"/>
-              <a:t>行</a:t>
-            </a:r>
-            <a:r>
-              <a:rPr lang="ja-JP" altLang="en-US" dirty="0"/>
-              <a:t>以内推奨</a:t>
-            </a:r>
-            <a:r>
-              <a:rPr lang="en-US" altLang="ja-JP" dirty="0"/>
-              <a:t>)</a:t>
+              <a:rPr lang="en-GB" dirty="0" smtClean="0">
+                <a:latin typeface="+mj-lt"/>
+              </a:rPr>
+              <a:t>AGENDA</a:t>
+            </a:r>
+            <a:endParaRPr lang="en-GB" dirty="0">
+              <a:latin typeface="+mj-lt"/>
+            </a:endParaRPr>
+          </a:p>
+        </p:txBody>
+      </p:sp>
+      <p:sp>
+        <p:nvSpPr>
+          <p:cNvPr id="6" name="Text Placeholder 5"/>
+          <p:cNvSpPr>
+            <a:spLocks noGrp="1"/>
+          </p:cNvSpPr>
+          <p:nvPr>
+            <p:ph type="body" sz="quarter" idx="10"/>
+          </p:nvPr>
+        </p:nvSpPr>
+        <p:spPr/>
+        <p:txBody>
+          <a:bodyPr/>
+          <a:lstStyle/>
+          <a:p>
+            <a:endParaRPr lang="en-GB" dirty="0" smtClean="0"/>
+          </a:p>
+          <a:p>
+            <a:r>
+              <a:rPr lang="en-GB" dirty="0" smtClean="0"/>
+              <a:t>Unity 2D Animation in the Past.</a:t>
+            </a:r>
+          </a:p>
+          <a:p>
+            <a:r>
+              <a:rPr lang="en-GB" dirty="0" smtClean="0"/>
+              <a:t>Frame by Frame Animation VS. </a:t>
+            </a:r>
+            <a:r>
+              <a:rPr lang="en-GB" smtClean="0"/>
+              <a:t>Skeletal Animation</a:t>
             </a:r>
             <a:endParaRPr lang="en-GB" dirty="0"/>
+          </a:p>
+          <a:p>
+            <a:r>
+              <a:rPr lang="en-GB" dirty="0" smtClean="0"/>
+              <a:t>Anima2D Demo</a:t>
+            </a:r>
+          </a:p>
+          <a:p>
+            <a:r>
+              <a:rPr lang="en-GB" dirty="0" smtClean="0"/>
+              <a:t>Native </a:t>
+            </a:r>
+            <a:r>
+              <a:rPr lang="en-GB" dirty="0"/>
+              <a:t>Animation tool sneak peek</a:t>
+            </a:r>
+          </a:p>
+          <a:p>
+            <a:r>
+              <a:rPr lang="en-GB" dirty="0" smtClean="0"/>
+              <a:t>Q &amp; A</a:t>
+            </a:r>
           </a:p>
         </p:txBody>
       </p:sp>
     </p:spTree>
     <p:extLst>
       <p:ext uri="{BB962C8B-B14F-4D97-AF65-F5344CB8AC3E}">
-        <p14:creationId xmlns:p14="http://schemas.microsoft.com/office/powerpoint/2010/main" val="3150575750"/>
+        <p14:creationId xmlns:p14="http://schemas.microsoft.com/office/powerpoint/2010/main" val="2717482734"/>
       </p:ext>
     </p:extLst>
   </p:cSld>
   <p:clrMapOvr>
     <a:masterClrMapping/>
   </p:clrMapOvr>
+  <mc:AlternateContent xmlns:mc="http://schemas.openxmlformats.org/markup-compatibility/2006" xmlns:p14="http://schemas.microsoft.com/office/powerpoint/2010/main">
+    <mc:Choice Requires="p14">
+      <p:transition spd="slow" p14:dur="2000"/>
+    </mc:Choice>
+    <mc:Fallback xmlns="">
+      <p:transition spd="slow"/>
+    </mc:Fallback>
+  </mc:AlternateContent>
   <p:timing>
     <p:tnLst>
       <p:par>
@@ -3749,44 +4194,51 @@
           <a:lstStyle/>
           <a:p>
             <a:r>
-              <a:rPr lang="en-GB" dirty="0" smtClean="0"/>
-              <a:t>Headline can go in two lines if necessary and will </a:t>
-            </a:r>
-            <a:r>
-              <a:rPr lang="en-GB" dirty="0" err="1" smtClean="0"/>
-              <a:t>center</a:t>
-            </a:r>
-            <a:r>
-              <a:rPr lang="en-GB" dirty="0" smtClean="0"/>
-              <a:t>-align vertically.</a:t>
-            </a:r>
-            <a:endParaRPr lang="en-GB" dirty="0"/>
+              <a:rPr lang="en-GB" dirty="0" smtClean="0">
+                <a:latin typeface="+mj-lt"/>
+              </a:rPr>
+              <a:t>Anima2D Demo</a:t>
+            </a:r>
+            <a:endParaRPr lang="en-GB" dirty="0">
+              <a:latin typeface="+mj-lt"/>
+            </a:endParaRPr>
           </a:p>
         </p:txBody>
       </p:sp>
-      <p:sp>
-        <p:nvSpPr>
-          <p:cNvPr id="6" name="Text Placeholder 5"/>
-          <p:cNvSpPr>
-            <a:spLocks noGrp="1"/>
-          </p:cNvSpPr>
-          <p:nvPr>
-            <p:ph type="body" sz="quarter" idx="10"/>
-          </p:nvPr>
-        </p:nvSpPr>
-        <p:spPr/>
-        <p:txBody>
-          <a:bodyPr/>
-          <a:lstStyle/>
-          <a:p>
-            <a:endParaRPr lang="en-GB" dirty="0" smtClean="0"/>
-          </a:p>
-        </p:txBody>
-      </p:sp>
+      <p:pic>
+        <p:nvPicPr>
+          <p:cNvPr id="2" name="Picture 1"/>
+          <p:cNvPicPr>
+            <a:picLocks noChangeAspect="1"/>
+          </p:cNvPicPr>
+          <p:nvPr/>
+        </p:nvPicPr>
+        <p:blipFill>
+          <a:blip r:embed="rId3" cstate="print">
+            <a:extLst>
+              <a:ext uri="{28A0092B-C50C-407E-A947-70E740481C1C}">
+                <a14:useLocalDpi xmlns:a14="http://schemas.microsoft.com/office/drawing/2010/main" val="0"/>
+              </a:ext>
+            </a:extLst>
+          </a:blip>
+          <a:stretch>
+            <a:fillRect/>
+          </a:stretch>
+        </p:blipFill>
+        <p:spPr>
+          <a:xfrm>
+            <a:off x="3210846" y="1419446"/>
+            <a:ext cx="2398307" cy="3197742"/>
+          </a:xfrm>
+          <a:prstGeom prst="rect">
+            <a:avLst/>
+          </a:prstGeom>
+        </p:spPr>
+      </p:pic>
     </p:spTree>
     <p:extLst>
       <p:ext uri="{BB962C8B-B14F-4D97-AF65-F5344CB8AC3E}">
-        <p14:creationId xmlns:p14="http://schemas.microsoft.com/office/powerpoint/2010/main" val="157880635"/>
+        <p14:creationId xmlns:p14="http://schemas.microsoft.com/office/powerpoint/2010/main" val="3379711719"/>
       </p:ext>
     </p:extLst>
   </p:cSld>
@@ -3844,29 +4296,14 @@
           <a:lstStyle/>
           <a:p>
             <a:r>
-              <a:rPr lang="ja-JP" altLang="ja-JP" dirty="0"/>
-              <a:t>見出しは最大</a:t>
-            </a:r>
-            <a:r>
-              <a:rPr lang="en-US" altLang="ja-JP" dirty="0"/>
-              <a:t>2</a:t>
-            </a:r>
-            <a:r>
-              <a:rPr lang="ja-JP" altLang="ja-JP" dirty="0"/>
-              <a:t>行になり、</a:t>
-            </a:r>
-            <a:r>
-              <a:rPr lang="en-US" altLang="ja-JP" dirty="0"/>
-              <a:t/>
-            </a:r>
-            <a:br>
-              <a:rPr lang="en-US" altLang="ja-JP" dirty="0"/>
-            </a:br>
-            <a:r>
-              <a:rPr lang="ja-JP" altLang="ja-JP" dirty="0"/>
-              <a:t>縦にセンタリングされます。</a:t>
-            </a:r>
-            <a:endParaRPr lang="en-GB" dirty="0"/>
+              <a:rPr lang="en-GB" dirty="0" smtClean="0">
+                <a:latin typeface="+mj-lt"/>
+              </a:rPr>
+              <a:t>Sneak Peek of the native animation tools</a:t>
+            </a:r>
+            <a:endParaRPr lang="en-GB" dirty="0">
+              <a:latin typeface="+mj-lt"/>
+            </a:endParaRPr>
           </a:p>
         </p:txBody>
       </p:sp>
@@ -3892,7 +4329,7 @@
     </p:spTree>
     <p:extLst>
       <p:ext uri="{BB962C8B-B14F-4D97-AF65-F5344CB8AC3E}">
-        <p14:creationId xmlns:p14="http://schemas.microsoft.com/office/powerpoint/2010/main" val="3180370519"/>
+        <p14:creationId xmlns:p14="http://schemas.microsoft.com/office/powerpoint/2010/main" val="2098284041"/>
       </p:ext>
     </p:extLst>
   </p:cSld>
@@ -3934,10 +4371,95 @@
           <a:chExt cx="0" cy="0"/>
         </a:xfrm>
       </p:grpSpPr>
+      <p:sp>
+        <p:nvSpPr>
+          <p:cNvPr id="5" name="Title 4"/>
+          <p:cNvSpPr>
+            <a:spLocks noGrp="1"/>
+          </p:cNvSpPr>
+          <p:nvPr>
+            <p:ph type="title"/>
+          </p:nvPr>
+        </p:nvSpPr>
+        <p:spPr/>
+        <p:txBody>
+          <a:bodyPr/>
+          <a:lstStyle/>
+          <a:p>
+            <a:r>
+              <a:rPr lang="en-GB" dirty="0" smtClean="0">
+                <a:latin typeface="+mj-lt"/>
+              </a:rPr>
+              <a:t>References</a:t>
+            </a:r>
+            <a:endParaRPr lang="en-GB" dirty="0">
+              <a:latin typeface="+mj-lt"/>
+            </a:endParaRPr>
+          </a:p>
+        </p:txBody>
+      </p:sp>
+      <p:sp>
+        <p:nvSpPr>
+          <p:cNvPr id="6" name="Text Placeholder 5"/>
+          <p:cNvSpPr>
+            <a:spLocks noGrp="1"/>
+          </p:cNvSpPr>
+          <p:nvPr>
+            <p:ph type="body" sz="quarter" idx="10"/>
+          </p:nvPr>
+        </p:nvSpPr>
+        <p:spPr/>
+        <p:txBody>
+          <a:bodyPr/>
+          <a:lstStyle/>
+          <a:p>
+            <a:r>
+              <a:rPr lang="en-GB" dirty="0" smtClean="0"/>
+              <a:t>Slides and demo Project</a:t>
+            </a:r>
+            <a:r>
+              <a:rPr lang="en-GB" dirty="0"/>
+              <a:t>: </a:t>
+            </a:r>
+            <a:endParaRPr lang="en-GB" dirty="0" smtClean="0"/>
+          </a:p>
+          <a:p>
+            <a:pPr lvl="1"/>
+            <a:r>
+              <a:rPr lang="en-GB" sz="1600" dirty="0" smtClean="0"/>
+              <a:t>https</a:t>
+            </a:r>
+            <a:r>
+              <a:rPr lang="en-GB" sz="1600" dirty="0"/>
+              <a:t>://github.com/ArturoNereu/Unity2DAnimation</a:t>
+            </a:r>
+            <a:endParaRPr lang="en-GB" dirty="0" smtClean="0"/>
+          </a:p>
+          <a:p>
+            <a:r>
+              <a:rPr lang="en-GB" dirty="0" smtClean="0"/>
+              <a:t>Anima2D </a:t>
+            </a:r>
+            <a:r>
+              <a:rPr lang="en-GB" dirty="0"/>
+              <a:t>Package: </a:t>
+            </a:r>
+            <a:endParaRPr lang="en-GB" dirty="0" smtClean="0"/>
+          </a:p>
+          <a:p>
+            <a:pPr lvl="1"/>
+            <a:r>
+              <a:rPr lang="en-GB" sz="1600" dirty="0"/>
+              <a:t>https://www.assetstore.unity3d.com/#!/content/79840</a:t>
+            </a:r>
+            <a:endParaRPr lang="en-GB" sz="1600" dirty="0" smtClean="0"/>
+          </a:p>
+        </p:txBody>
+      </p:sp>
     </p:spTree>
     <p:extLst>
       <p:ext uri="{BB962C8B-B14F-4D97-AF65-F5344CB8AC3E}">
-        <p14:creationId xmlns:p14="http://schemas.microsoft.com/office/powerpoint/2010/main" val="254590307"/>
+        <p14:creationId xmlns:p14="http://schemas.microsoft.com/office/powerpoint/2010/main" val="1887431108"/>
       </p:ext>
     </p:extLst>
   </p:cSld>

</xml_diff>

<commit_message>
Draft of PPT now on 0.2
</commit_message>
<xml_diff>
--- a/Presentations/Future2DAnim_Tokyo.pptx
+++ b/Presentations/Future2DAnim_Tokyo.pptx
@@ -5,23 +5,26 @@
     <p:sldMasterId id="2147483648" r:id="rId1"/>
   </p:sldMasterIdLst>
   <p:notesMasterIdLst>
-    <p:notesMasterId r:id="rId13"/>
+    <p:notesMasterId r:id="rId16"/>
   </p:notesMasterIdLst>
   <p:handoutMasterIdLst>
-    <p:handoutMasterId r:id="rId14"/>
+    <p:handoutMasterId r:id="rId17"/>
   </p:handoutMasterIdLst>
   <p:sldIdLst>
     <p:sldId id="283" r:id="rId2"/>
     <p:sldId id="256" r:id="rId3"/>
-    <p:sldId id="278" r:id="rId4"/>
-    <p:sldId id="257" r:id="rId5"/>
-    <p:sldId id="264" r:id="rId6"/>
-    <p:sldId id="286" r:id="rId7"/>
-    <p:sldId id="287" r:id="rId8"/>
-    <p:sldId id="288" r:id="rId9"/>
-    <p:sldId id="285" r:id="rId10"/>
-    <p:sldId id="276" r:id="rId11"/>
-    <p:sldId id="284" r:id="rId12"/>
+    <p:sldId id="257" r:id="rId4"/>
+    <p:sldId id="278" r:id="rId5"/>
+    <p:sldId id="286" r:id="rId6"/>
+    <p:sldId id="289" r:id="rId7"/>
+    <p:sldId id="290" r:id="rId8"/>
+    <p:sldId id="291" r:id="rId9"/>
+    <p:sldId id="292" r:id="rId10"/>
+    <p:sldId id="287" r:id="rId11"/>
+    <p:sldId id="288" r:id="rId12"/>
+    <p:sldId id="285" r:id="rId13"/>
+    <p:sldId id="276" r:id="rId14"/>
+    <p:sldId id="284" r:id="rId15"/>
   </p:sldIdLst>
   <p:sldSz cx="9144000" cy="5143500" type="screen16x9"/>
   <p:notesSz cx="6858000" cy="9144000"/>
@@ -551,6 +554,107 @@
 </p:notes>
 </file>
 
+<file path=ppt/notesSlides/notesSlide10.xml><?xml version="1.0" encoding="utf-8"?>
+<p:notes xmlns:a="http://schemas.openxmlformats.org/drawingml/2006/main" xmlns:r="http://schemas.openxmlformats.org/officeDocument/2006/relationships" xmlns:p="http://schemas.openxmlformats.org/presentationml/2006/main">
+  <p:cSld>
+    <p:spTree>
+      <p:nvGrpSpPr>
+        <p:cNvPr id="1" name=""/>
+        <p:cNvGrpSpPr/>
+        <p:nvPr/>
+      </p:nvGrpSpPr>
+      <p:grpSpPr>
+        <a:xfrm>
+          <a:off x="0" y="0"/>
+          <a:ext cx="0" cy="0"/>
+          <a:chOff x="0" y="0"/>
+          <a:chExt cx="0" cy="0"/>
+        </a:xfrm>
+      </p:grpSpPr>
+      <p:sp>
+        <p:nvSpPr>
+          <p:cNvPr id="2" name="Slide Image Placeholder 1"/>
+          <p:cNvSpPr>
+            <a:spLocks noGrp="1" noRot="1" noChangeAspect="1"/>
+          </p:cNvSpPr>
+          <p:nvPr>
+            <p:ph type="sldImg"/>
+          </p:nvPr>
+        </p:nvSpPr>
+        <p:spPr/>
+      </p:sp>
+      <p:sp>
+        <p:nvSpPr>
+          <p:cNvPr id="3" name="Notes Placeholder 2"/>
+          <p:cNvSpPr>
+            <a:spLocks noGrp="1"/>
+          </p:cNvSpPr>
+          <p:nvPr>
+            <p:ph type="body" idx="1"/>
+          </p:nvPr>
+        </p:nvSpPr>
+        <p:spPr/>
+        <p:txBody>
+          <a:bodyPr/>
+          <a:lstStyle/>
+          <a:p>
+            <a:r>
+              <a:rPr lang="en-GB" dirty="0" smtClean="0"/>
+              <a:t>Thank you! </a:t>
+            </a:r>
+            <a:r>
+              <a:rPr lang="ja-JP" altLang="en-US" sz="900" b="1" i="0" kern="1200" dirty="0" smtClean="0">
+                <a:solidFill>
+                  <a:schemeClr val="tx1"/>
+                </a:solidFill>
+                <a:effectLst/>
+                <a:latin typeface="Arial" panose="020B0604020202020204" pitchFamily="34" charset="0"/>
+                <a:ea typeface="+mn-ea"/>
+                <a:cs typeface="+mn-cs"/>
+              </a:rPr>
+              <a:t>ありがとう</a:t>
+            </a:r>
+            <a:endParaRPr lang="en-GB" dirty="0"/>
+          </a:p>
+        </p:txBody>
+      </p:sp>
+      <p:sp>
+        <p:nvSpPr>
+          <p:cNvPr id="4" name="Slide Number Placeholder 3"/>
+          <p:cNvSpPr>
+            <a:spLocks noGrp="1"/>
+          </p:cNvSpPr>
+          <p:nvPr>
+            <p:ph type="sldNum" sz="quarter" idx="10"/>
+          </p:nvPr>
+        </p:nvSpPr>
+        <p:spPr/>
+        <p:txBody>
+          <a:bodyPr/>
+          <a:lstStyle/>
+          <a:p>
+            <a:fld id="{49436F85-577F-4A92-A47F-D540A2BCC821}" type="slidenum">
+              <a:rPr lang="en-GB" smtClean="0"/>
+              <a:pPr/>
+              <a:t>14</a:t>
+            </a:fld>
+            <a:endParaRPr lang="en-GB" dirty="0"/>
+          </a:p>
+        </p:txBody>
+      </p:sp>
+    </p:spTree>
+    <p:extLst>
+      <p:ext uri="{BB962C8B-B14F-4D97-AF65-F5344CB8AC3E}">
+        <p14:creationId xmlns:p14="http://schemas.microsoft.com/office/powerpoint/2010/main" val="1251812793"/>
+      </p:ext>
+    </p:extLst>
+  </p:cSld>
+  <p:clrMapOvr>
+    <a:masterClrMapping/>
+  </p:clrMapOvr>
+</p:notes>
+</file>
+
 <file path=ppt/notesSlides/notesSlide2.xml><?xml version="1.0" encoding="utf-8"?>
 <p:notes xmlns:a="http://schemas.openxmlformats.org/drawingml/2006/main" xmlns:r="http://schemas.openxmlformats.org/officeDocument/2006/relationships" xmlns:p="http://schemas.openxmlformats.org/presentationml/2006/main">
   <p:cSld>
@@ -595,7 +699,7 @@
           <a:bodyPr/>
           <a:lstStyle/>
           <a:p>
-            <a:endParaRPr lang="en-GB"/>
+            <a:endParaRPr lang="en-GB" dirty="0"/>
           </a:p>
         </p:txBody>
       </p:sp>
@@ -617,7 +721,7 @@
             <a:fld id="{49436F85-577F-4A92-A47F-D540A2BCC821}" type="slidenum">
               <a:rPr lang="en-GB" smtClean="0"/>
               <a:pPr/>
-              <a:t>4</a:t>
+              <a:t>3</a:t>
             </a:fld>
             <a:endParaRPr lang="en-GB" dirty="0"/>
           </a:p>
@@ -680,7 +784,24 @@
           <a:bodyPr/>
           <a:lstStyle/>
           <a:p>
-            <a:endParaRPr lang="en-GB"/>
+            <a:r>
+              <a:rPr lang="en-GB" dirty="0" smtClean="0"/>
+              <a:t>Here, we will mention the main objectives of attending the talk. </a:t>
+            </a:r>
+          </a:p>
+          <a:p>
+            <a:endParaRPr lang="en-GB" dirty="0" smtClean="0"/>
+          </a:p>
+          <a:p>
+            <a:r>
+              <a:rPr lang="en-GB" dirty="0" smtClean="0"/>
+              <a:t>Note for translators: Maybe this is the key slide, since we need to make sure that attendees can</a:t>
+            </a:r>
+            <a:r>
+              <a:rPr lang="en-GB" baseline="0" dirty="0" smtClean="0"/>
+              <a:t> leave the room with the knowledge we propose here.</a:t>
+            </a:r>
+            <a:endParaRPr lang="en-GB" dirty="0"/>
           </a:p>
         </p:txBody>
       </p:sp>
@@ -711,7 +832,7 @@
     </p:spTree>
     <p:extLst>
       <p:ext uri="{BB962C8B-B14F-4D97-AF65-F5344CB8AC3E}">
-        <p14:creationId xmlns:p14="http://schemas.microsoft.com/office/powerpoint/2010/main" val="3797292388"/>
+        <p14:creationId xmlns:p14="http://schemas.microsoft.com/office/powerpoint/2010/main" val="1936601504"/>
       </p:ext>
     </p:extLst>
   </p:cSld>
@@ -796,7 +917,7 @@
     </p:spTree>
     <p:extLst>
       <p:ext uri="{BB962C8B-B14F-4D97-AF65-F5344CB8AC3E}">
-        <p14:creationId xmlns:p14="http://schemas.microsoft.com/office/powerpoint/2010/main" val="1936601504"/>
+        <p14:creationId xmlns:p14="http://schemas.microsoft.com/office/powerpoint/2010/main" val="3946937812"/>
       </p:ext>
     </p:extLst>
   </p:cSld>
@@ -852,27 +973,38 @@
           <a:p>
             <a:r>
               <a:rPr lang="en-GB" dirty="0" smtClean="0"/>
-              <a:t>In this part, I will show a demo using Unity (the software)</a:t>
+              <a:t>This slide is to define what the purpose of animation in games is.</a:t>
             </a:r>
             <a:r>
               <a:rPr lang="en-GB" baseline="0" dirty="0" smtClean="0"/>
-              <a:t> to Rig, Animate and Move a character using the Anima2D Animation Tool. </a:t>
-            </a:r>
+              <a:t> Which is simulate that the characters and other elements in the game are alive.</a:t>
+            </a:r>
+          </a:p>
+          <a:p>
+            <a:endParaRPr lang="en-GB" baseline="0" dirty="0" smtClean="0"/>
           </a:p>
           <a:p>
             <a:r>
               <a:rPr lang="en-GB" baseline="0" dirty="0" smtClean="0"/>
-              <a:t>I’m still working on the Assets but, key important things to know are: Bones, Vertices, Attachments, Timeline, </a:t>
+              <a:t>The animation is known also as the illusion of life, which basically transforms unanimated drawings or models into living characters. No matter which animation technique we end up using, the goal is to always have a consistent animation that makes the player he is inside the video game.</a:t>
+            </a:r>
+          </a:p>
+          <a:p>
+            <a:endParaRPr lang="en-GB" baseline="0" dirty="0" smtClean="0"/>
+          </a:p>
+          <a:p>
+            <a:r>
+              <a:rPr lang="en-GB" baseline="0" dirty="0" smtClean="0"/>
+              <a:t>If for any reason, the animation fails (breaks, is not good enough, drops frames, </a:t>
             </a:r>
             <a:r>
               <a:rPr lang="en-GB" baseline="0" dirty="0" err="1" smtClean="0"/>
-              <a:t>Dopesheei</a:t>
+              <a:t>etc</a:t>
             </a:r>
             <a:r>
               <a:rPr lang="en-GB" baseline="0" dirty="0" smtClean="0"/>
-              <a:t>, IK, animation curve and interpolation.</a:t>
-            </a:r>
-            <a:endParaRPr lang="en-GB" dirty="0"/>
+              <a:t>) the player will feel disconnected from the game and will start thinking about it as a piece of software. We want to avoid that.</a:t>
+            </a:r>
           </a:p>
         </p:txBody>
       </p:sp>
@@ -903,7 +1035,7 @@
     </p:spTree>
     <p:extLst>
       <p:ext uri="{BB962C8B-B14F-4D97-AF65-F5344CB8AC3E}">
-        <p14:creationId xmlns:p14="http://schemas.microsoft.com/office/powerpoint/2010/main" val="2342777617"/>
+        <p14:creationId xmlns:p14="http://schemas.microsoft.com/office/powerpoint/2010/main" val="1135882957"/>
       </p:ext>
     </p:extLst>
   </p:cSld>
@@ -959,11 +1091,29 @@
           <a:p>
             <a:r>
               <a:rPr lang="en-GB" dirty="0" smtClean="0"/>
-              <a:t>Here, I will show videos that</a:t>
+              <a:t>In this part, I will show a demo using Unity (the software)</a:t>
             </a:r>
             <a:r>
               <a:rPr lang="en-GB" baseline="0" dirty="0" smtClean="0"/>
-              <a:t> demonstrates the progress of</a:t>
+              <a:t> to Rig, Animate and Move a character using the Anima2D Animation Tool. </a:t>
+            </a:r>
+          </a:p>
+          <a:p>
+            <a:r>
+              <a:rPr lang="en-GB" baseline="0" dirty="0" smtClean="0"/>
+              <a:t>I’m still working on the Assets but, key important things to know are: Bones, Vertices, Attachments, Timeline, </a:t>
+            </a:r>
+            <a:r>
+              <a:rPr lang="en-GB" baseline="0" dirty="0" err="1" smtClean="0"/>
+              <a:t>Dopesheet</a:t>
+            </a:r>
+            <a:r>
+              <a:rPr lang="en-GB" baseline="0" dirty="0" smtClean="0"/>
+              <a:t>, </a:t>
+            </a:r>
+            <a:r>
+              <a:rPr lang="en-GB" baseline="0" dirty="0" smtClean="0"/>
+              <a:t>IK, animation curve and interpolation.</a:t>
             </a:r>
             <a:endParaRPr lang="en-GB" dirty="0"/>
           </a:p>
@@ -987,7 +1137,7 @@
             <a:fld id="{49436F85-577F-4A92-A47F-D540A2BCC821}" type="slidenum">
               <a:rPr lang="en-GB" smtClean="0"/>
               <a:pPr/>
-              <a:t>8</a:t>
+              <a:t>10</a:t>
             </a:fld>
             <a:endParaRPr lang="en-GB" dirty="0"/>
           </a:p>
@@ -996,7 +1146,7 @@
     </p:spTree>
     <p:extLst>
       <p:ext uri="{BB962C8B-B14F-4D97-AF65-F5344CB8AC3E}">
-        <p14:creationId xmlns:p14="http://schemas.microsoft.com/office/powerpoint/2010/main" val="8296490"/>
+        <p14:creationId xmlns:p14="http://schemas.microsoft.com/office/powerpoint/2010/main" val="2342777617"/>
       </p:ext>
     </p:extLst>
   </p:cSld>
@@ -1050,7 +1200,19 @@
           <a:bodyPr/>
           <a:lstStyle/>
           <a:p>
-            <a:endParaRPr lang="en-GB"/>
+            <a:r>
+              <a:rPr lang="en-GB" dirty="0" smtClean="0"/>
+              <a:t>Here, I will show videos that</a:t>
+            </a:r>
+            <a:r>
+              <a:rPr lang="en-GB" baseline="0" dirty="0" smtClean="0"/>
+              <a:t> demonstrates the progress </a:t>
+            </a:r>
+            <a:r>
+              <a:rPr lang="en-GB" baseline="0" dirty="0" smtClean="0"/>
+              <a:t>of the native Animation tool for 2D in Unity. I’m waiting for the material but the examples here will be similar to what I showed in the demo, the difference is that they will now be integrated in the software and not via an external plugin as it is now.</a:t>
+            </a:r>
+            <a:endParaRPr lang="en-GB" dirty="0"/>
           </a:p>
         </p:txBody>
       </p:sp>
@@ -1072,7 +1234,7 @@
             <a:fld id="{49436F85-577F-4A92-A47F-D540A2BCC821}" type="slidenum">
               <a:rPr lang="en-GB" smtClean="0"/>
               <a:pPr/>
-              <a:t>9</a:t>
+              <a:t>11</a:t>
             </a:fld>
             <a:endParaRPr lang="en-GB" dirty="0"/>
           </a:p>
@@ -1081,7 +1243,7 @@
     </p:spTree>
     <p:extLst>
       <p:ext uri="{BB962C8B-B14F-4D97-AF65-F5344CB8AC3E}">
-        <p14:creationId xmlns:p14="http://schemas.microsoft.com/office/powerpoint/2010/main" val="3231049928"/>
+        <p14:creationId xmlns:p14="http://schemas.microsoft.com/office/powerpoint/2010/main" val="8296490"/>
       </p:ext>
     </p:extLst>
   </p:cSld>
@@ -1135,21 +1297,7 @@
           <a:bodyPr/>
           <a:lstStyle/>
           <a:p>
-            <a:r>
-              <a:rPr lang="en-US" dirty="0" smtClean="0"/>
-              <a:t>Q&amp;A</a:t>
-            </a:r>
-            <a:endParaRPr lang="en-US" baseline="0" dirty="0" smtClean="0"/>
-          </a:p>
-          <a:p>
-            <a:endParaRPr lang="en-US" baseline="0" dirty="0" smtClean="0"/>
-          </a:p>
-          <a:p>
-            <a:r>
-              <a:rPr lang="en-US" baseline="0" dirty="0" smtClean="0"/>
-              <a:t>Note for Translator: How do I say Q&amp;A in Japanese?</a:t>
-            </a:r>
-            <a:endParaRPr lang="en-GB" dirty="0"/>
+            <a:endParaRPr lang="en-GB"/>
           </a:p>
         </p:txBody>
       </p:sp>
@@ -1171,7 +1319,7 @@
             <a:fld id="{49436F85-577F-4A92-A47F-D540A2BCC821}" type="slidenum">
               <a:rPr lang="en-GB" smtClean="0"/>
               <a:pPr/>
-              <a:t>10</a:t>
+              <a:t>12</a:t>
             </a:fld>
             <a:endParaRPr lang="en-GB" dirty="0"/>
           </a:p>
@@ -1180,7 +1328,7 @@
     </p:spTree>
     <p:extLst>
       <p:ext uri="{BB962C8B-B14F-4D97-AF65-F5344CB8AC3E}">
-        <p14:creationId xmlns:p14="http://schemas.microsoft.com/office/powerpoint/2010/main" val="947654780"/>
+        <p14:creationId xmlns:p14="http://schemas.microsoft.com/office/powerpoint/2010/main" val="3231049928"/>
       </p:ext>
     </p:extLst>
   </p:cSld>
@@ -1235,20 +1383,18 @@
           <a:lstStyle/>
           <a:p>
             <a:r>
-              <a:rPr lang="en-GB" dirty="0" smtClean="0"/>
-              <a:t>Thank you! </a:t>
-            </a:r>
-            <a:r>
-              <a:rPr lang="ja-JP" altLang="en-US" sz="900" b="1" i="0" kern="1200" dirty="0" smtClean="0">
-                <a:solidFill>
-                  <a:schemeClr val="tx1"/>
-                </a:solidFill>
-                <a:effectLst/>
-                <a:latin typeface="Arial" panose="020B0604020202020204" pitchFamily="34" charset="0"/>
-                <a:ea typeface="+mn-ea"/>
-                <a:cs typeface="+mn-cs"/>
-              </a:rPr>
-              <a:t>ありがとう</a:t>
+              <a:rPr lang="en-US" dirty="0" smtClean="0"/>
+              <a:t>Q&amp;A</a:t>
+            </a:r>
+            <a:endParaRPr lang="en-US" baseline="0" dirty="0" smtClean="0"/>
+          </a:p>
+          <a:p>
+            <a:endParaRPr lang="en-US" baseline="0" dirty="0" smtClean="0"/>
+          </a:p>
+          <a:p>
+            <a:r>
+              <a:rPr lang="en-US" baseline="0" dirty="0" smtClean="0"/>
+              <a:t>Note for Translator: How do I say Q&amp;A in Japanese?</a:t>
             </a:r>
             <a:endParaRPr lang="en-GB" dirty="0"/>
           </a:p>
@@ -1272,7 +1418,7 @@
             <a:fld id="{49436F85-577F-4A92-A47F-D540A2BCC821}" type="slidenum">
               <a:rPr lang="en-GB" smtClean="0"/>
               <a:pPr/>
-              <a:t>11</a:t>
+              <a:t>13</a:t>
             </a:fld>
             <a:endParaRPr lang="en-GB" dirty="0"/>
           </a:p>
@@ -1281,7 +1427,7 @@
     </p:spTree>
     <p:extLst>
       <p:ext uri="{BB962C8B-B14F-4D97-AF65-F5344CB8AC3E}">
-        <p14:creationId xmlns:p14="http://schemas.microsoft.com/office/powerpoint/2010/main" val="1251812793"/>
+        <p14:creationId xmlns:p14="http://schemas.microsoft.com/office/powerpoint/2010/main" val="947654780"/>
       </p:ext>
     </p:extLst>
   </p:cSld>
@@ -3614,6 +3760,351 @@
       </p:grpSpPr>
       <p:sp>
         <p:nvSpPr>
+          <p:cNvPr id="5" name="Title 4"/>
+          <p:cNvSpPr>
+            <a:spLocks noGrp="1"/>
+          </p:cNvSpPr>
+          <p:nvPr>
+            <p:ph type="title"/>
+          </p:nvPr>
+        </p:nvSpPr>
+        <p:spPr/>
+        <p:txBody>
+          <a:bodyPr/>
+          <a:lstStyle/>
+          <a:p>
+            <a:r>
+              <a:rPr lang="en-GB" dirty="0" smtClean="0">
+                <a:latin typeface="+mj-lt"/>
+              </a:rPr>
+              <a:t>Anima2D Demo</a:t>
+            </a:r>
+            <a:endParaRPr lang="en-GB" dirty="0">
+              <a:latin typeface="+mj-lt"/>
+            </a:endParaRPr>
+          </a:p>
+        </p:txBody>
+      </p:sp>
+      <p:pic>
+        <p:nvPicPr>
+          <p:cNvPr id="2" name="Picture 1"/>
+          <p:cNvPicPr>
+            <a:picLocks noChangeAspect="1"/>
+          </p:cNvPicPr>
+          <p:nvPr/>
+        </p:nvPicPr>
+        <p:blipFill>
+          <a:blip r:embed="rId3" cstate="print">
+            <a:extLst>
+              <a:ext uri="{28A0092B-C50C-407E-A947-70E740481C1C}">
+                <a14:useLocalDpi xmlns:a14="http://schemas.microsoft.com/office/drawing/2010/main" val="0"/>
+              </a:ext>
+            </a:extLst>
+          </a:blip>
+          <a:stretch>
+            <a:fillRect/>
+          </a:stretch>
+        </p:blipFill>
+        <p:spPr>
+          <a:xfrm>
+            <a:off x="3210846" y="1419446"/>
+            <a:ext cx="2398307" cy="3197742"/>
+          </a:xfrm>
+          <a:prstGeom prst="rect">
+            <a:avLst/>
+          </a:prstGeom>
+        </p:spPr>
+      </p:pic>
+    </p:spTree>
+    <p:extLst>
+      <p:ext uri="{BB962C8B-B14F-4D97-AF65-F5344CB8AC3E}">
+        <p14:creationId xmlns:p14="http://schemas.microsoft.com/office/powerpoint/2010/main" val="3379711719"/>
+      </p:ext>
+    </p:extLst>
+  </p:cSld>
+  <p:clrMapOvr>
+    <a:masterClrMapping/>
+  </p:clrMapOvr>
+  <mc:AlternateContent xmlns:mc="http://schemas.openxmlformats.org/markup-compatibility/2006" xmlns:p14="http://schemas.microsoft.com/office/powerpoint/2010/main">
+    <mc:Choice Requires="p14">
+      <p:transition spd="slow" p14:dur="2000"/>
+    </mc:Choice>
+    <mc:Fallback xmlns="">
+      <p:transition spd="slow"/>
+    </mc:Fallback>
+  </mc:AlternateContent>
+  <p:timing>
+    <p:tnLst>
+      <p:par>
+        <p:cTn id="1" dur="indefinite" restart="never" nodeType="tmRoot"/>
+      </p:par>
+    </p:tnLst>
+  </p:timing>
+</p:sld>
+</file>
+
+<file path=ppt/slides/slide11.xml><?xml version="1.0" encoding="utf-8"?>
+<p:sld xmlns:a="http://schemas.openxmlformats.org/drawingml/2006/main" xmlns:r="http://schemas.openxmlformats.org/officeDocument/2006/relationships" xmlns:p="http://schemas.openxmlformats.org/presentationml/2006/main">
+  <p:cSld>
+    <p:spTree>
+      <p:nvGrpSpPr>
+        <p:cNvPr id="1" name=""/>
+        <p:cNvGrpSpPr/>
+        <p:nvPr/>
+      </p:nvGrpSpPr>
+      <p:grpSpPr>
+        <a:xfrm>
+          <a:off x="0" y="0"/>
+          <a:ext cx="0" cy="0"/>
+          <a:chOff x="0" y="0"/>
+          <a:chExt cx="0" cy="0"/>
+        </a:xfrm>
+      </p:grpSpPr>
+      <p:sp>
+        <p:nvSpPr>
+          <p:cNvPr id="5" name="Title 4"/>
+          <p:cNvSpPr>
+            <a:spLocks noGrp="1"/>
+          </p:cNvSpPr>
+          <p:nvPr>
+            <p:ph type="title"/>
+          </p:nvPr>
+        </p:nvSpPr>
+        <p:spPr/>
+        <p:txBody>
+          <a:bodyPr/>
+          <a:lstStyle/>
+          <a:p>
+            <a:r>
+              <a:rPr lang="en-GB" dirty="0" smtClean="0">
+                <a:latin typeface="+mj-lt"/>
+              </a:rPr>
+              <a:t>Sneak Peek of the native animation tools</a:t>
+            </a:r>
+            <a:endParaRPr lang="en-GB" dirty="0">
+              <a:latin typeface="+mj-lt"/>
+            </a:endParaRPr>
+          </a:p>
+        </p:txBody>
+      </p:sp>
+      <p:sp>
+        <p:nvSpPr>
+          <p:cNvPr id="6" name="Text Placeholder 5"/>
+          <p:cNvSpPr>
+            <a:spLocks noGrp="1"/>
+          </p:cNvSpPr>
+          <p:nvPr>
+            <p:ph type="body" sz="quarter" idx="10"/>
+          </p:nvPr>
+        </p:nvSpPr>
+        <p:spPr/>
+        <p:txBody>
+          <a:bodyPr/>
+          <a:lstStyle/>
+          <a:p>
+            <a:endParaRPr lang="en-GB" dirty="0" smtClean="0"/>
+          </a:p>
+        </p:txBody>
+      </p:sp>
+    </p:spTree>
+    <p:extLst>
+      <p:ext uri="{BB962C8B-B14F-4D97-AF65-F5344CB8AC3E}">
+        <p14:creationId xmlns:p14="http://schemas.microsoft.com/office/powerpoint/2010/main" val="2098284041"/>
+      </p:ext>
+    </p:extLst>
+  </p:cSld>
+  <p:clrMapOvr>
+    <a:masterClrMapping/>
+  </p:clrMapOvr>
+  <mc:AlternateContent xmlns:mc="http://schemas.openxmlformats.org/markup-compatibility/2006" xmlns:p14="http://schemas.microsoft.com/office/powerpoint/2010/main">
+    <mc:Choice Requires="p14">
+      <p:transition spd="slow" p14:dur="2000"/>
+    </mc:Choice>
+    <mc:Fallback xmlns="">
+      <p:transition spd="slow"/>
+    </mc:Fallback>
+  </mc:AlternateContent>
+  <p:timing>
+    <p:tnLst>
+      <p:par>
+        <p:cTn id="1" dur="indefinite" restart="never" nodeType="tmRoot"/>
+      </p:par>
+    </p:tnLst>
+  </p:timing>
+</p:sld>
+</file>
+
+<file path=ppt/slides/slide12.xml><?xml version="1.0" encoding="utf-8"?>
+<p:sld xmlns:a="http://schemas.openxmlformats.org/drawingml/2006/main" xmlns:r="http://schemas.openxmlformats.org/officeDocument/2006/relationships" xmlns:p="http://schemas.openxmlformats.org/presentationml/2006/main">
+  <p:cSld>
+    <p:spTree>
+      <p:nvGrpSpPr>
+        <p:cNvPr id="1" name=""/>
+        <p:cNvGrpSpPr/>
+        <p:nvPr/>
+      </p:nvGrpSpPr>
+      <p:grpSpPr>
+        <a:xfrm>
+          <a:off x="0" y="0"/>
+          <a:ext cx="0" cy="0"/>
+          <a:chOff x="0" y="0"/>
+          <a:chExt cx="0" cy="0"/>
+        </a:xfrm>
+      </p:grpSpPr>
+      <p:sp>
+        <p:nvSpPr>
+          <p:cNvPr id="5" name="Title 4"/>
+          <p:cNvSpPr>
+            <a:spLocks noGrp="1"/>
+          </p:cNvSpPr>
+          <p:nvPr>
+            <p:ph type="title"/>
+          </p:nvPr>
+        </p:nvSpPr>
+        <p:spPr/>
+        <p:txBody>
+          <a:bodyPr/>
+          <a:lstStyle/>
+          <a:p>
+            <a:r>
+              <a:rPr lang="en-GB" dirty="0" smtClean="0">
+                <a:latin typeface="+mj-lt"/>
+              </a:rPr>
+              <a:t>References</a:t>
+            </a:r>
+            <a:endParaRPr lang="en-GB" dirty="0">
+              <a:latin typeface="+mj-lt"/>
+            </a:endParaRPr>
+          </a:p>
+        </p:txBody>
+      </p:sp>
+      <p:sp>
+        <p:nvSpPr>
+          <p:cNvPr id="6" name="Text Placeholder 5"/>
+          <p:cNvSpPr>
+            <a:spLocks noGrp="1"/>
+          </p:cNvSpPr>
+          <p:nvPr>
+            <p:ph type="body" sz="quarter" idx="10"/>
+          </p:nvPr>
+        </p:nvSpPr>
+        <p:spPr/>
+        <p:txBody>
+          <a:bodyPr/>
+          <a:lstStyle/>
+          <a:p>
+            <a:r>
+              <a:rPr lang="en-GB" sz="2000" dirty="0" smtClean="0">
+                <a:latin typeface="+mj-lt"/>
+              </a:rPr>
+              <a:t>Slides and demo Project</a:t>
+            </a:r>
+            <a:r>
+              <a:rPr lang="en-GB" sz="2000" dirty="0">
+                <a:latin typeface="+mj-lt"/>
+              </a:rPr>
+              <a:t>: </a:t>
+            </a:r>
+            <a:endParaRPr lang="en-GB" sz="2000" dirty="0" smtClean="0">
+              <a:latin typeface="+mj-lt"/>
+            </a:endParaRPr>
+          </a:p>
+          <a:p>
+            <a:pPr lvl="1"/>
+            <a:r>
+              <a:rPr lang="en-GB" dirty="0" smtClean="0">
+                <a:latin typeface="+mj-lt"/>
+              </a:rPr>
+              <a:t>https</a:t>
+            </a:r>
+            <a:r>
+              <a:rPr lang="en-GB" dirty="0">
+                <a:latin typeface="+mj-lt"/>
+              </a:rPr>
+              <a:t>://github.com/ArturoNereu/Unity2DAnimation</a:t>
+            </a:r>
+            <a:endParaRPr lang="en-GB" sz="2000" dirty="0" smtClean="0">
+              <a:latin typeface="+mj-lt"/>
+            </a:endParaRPr>
+          </a:p>
+          <a:p>
+            <a:r>
+              <a:rPr lang="en-GB" sz="2000" dirty="0" smtClean="0">
+                <a:latin typeface="+mj-lt"/>
+              </a:rPr>
+              <a:t>Anima2D </a:t>
+            </a:r>
+            <a:r>
+              <a:rPr lang="en-GB" sz="2000" dirty="0">
+                <a:latin typeface="+mj-lt"/>
+              </a:rPr>
+              <a:t>Package: </a:t>
+            </a:r>
+            <a:endParaRPr lang="en-GB" sz="2000" dirty="0" smtClean="0">
+              <a:latin typeface="+mj-lt"/>
+            </a:endParaRPr>
+          </a:p>
+          <a:p>
+            <a:pPr lvl="1"/>
+            <a:r>
+              <a:rPr lang="en-GB" dirty="0">
+                <a:latin typeface="+mj-lt"/>
+              </a:rPr>
+              <a:t>https://www.assetstore.unity3d.com/#!/content/79840</a:t>
+            </a:r>
+            <a:endParaRPr lang="en-GB" dirty="0" smtClean="0">
+              <a:latin typeface="+mj-lt"/>
+            </a:endParaRPr>
+          </a:p>
+        </p:txBody>
+      </p:sp>
+    </p:spTree>
+    <p:extLst>
+      <p:ext uri="{BB962C8B-B14F-4D97-AF65-F5344CB8AC3E}">
+        <p14:creationId xmlns:p14="http://schemas.microsoft.com/office/powerpoint/2010/main" val="1887431108"/>
+      </p:ext>
+    </p:extLst>
+  </p:cSld>
+  <p:clrMapOvr>
+    <a:masterClrMapping/>
+  </p:clrMapOvr>
+  <mc:AlternateContent xmlns:mc="http://schemas.openxmlformats.org/markup-compatibility/2006" xmlns:p14="http://schemas.microsoft.com/office/powerpoint/2010/main">
+    <mc:Choice Requires="p14">
+      <p:transition spd="slow" p14:dur="2000"/>
+    </mc:Choice>
+    <mc:Fallback xmlns="">
+      <p:transition spd="slow"/>
+    </mc:Fallback>
+  </mc:AlternateContent>
+  <p:timing>
+    <p:tnLst>
+      <p:par>
+        <p:cTn id="1" dur="indefinite" restart="never" nodeType="tmRoot"/>
+      </p:par>
+    </p:tnLst>
+  </p:timing>
+</p:sld>
+</file>
+
+<file path=ppt/slides/slide13.xml><?xml version="1.0" encoding="utf-8"?>
+<p:sld xmlns:a="http://schemas.openxmlformats.org/drawingml/2006/main" xmlns:r="http://schemas.openxmlformats.org/officeDocument/2006/relationships" xmlns:p="http://schemas.openxmlformats.org/presentationml/2006/main">
+  <p:cSld>
+    <p:spTree>
+      <p:nvGrpSpPr>
+        <p:cNvPr id="1" name=""/>
+        <p:cNvGrpSpPr/>
+        <p:nvPr/>
+      </p:nvGrpSpPr>
+      <p:grpSpPr>
+        <a:xfrm>
+          <a:off x="0" y="0"/>
+          <a:ext cx="0" cy="0"/>
+          <a:chOff x="0" y="0"/>
+          <a:chExt cx="0" cy="0"/>
+        </a:xfrm>
+      </p:grpSpPr>
+      <p:sp>
+        <p:nvSpPr>
           <p:cNvPr id="2" name="Titel 1"/>
           <p:cNvSpPr>
             <a:spLocks noGrp="1"/>
@@ -3667,7 +4158,7 @@
 </p:sld>
 </file>
 
-<file path=ppt/slides/slide11.xml><?xml version="1.0" encoding="utf-8"?>
+<file path=ppt/slides/slide14.xml><?xml version="1.0" encoding="utf-8"?>
 <p:sld xmlns:a="http://schemas.openxmlformats.org/drawingml/2006/main" xmlns:r="http://schemas.openxmlformats.org/officeDocument/2006/relationships" xmlns:p="http://schemas.openxmlformats.org/presentationml/2006/main">
   <p:cSld>
     <p:spTree>
@@ -3791,6 +4282,70 @@
       </p:grpSpPr>
       <p:sp>
         <p:nvSpPr>
+          <p:cNvPr id="2" name="Title 1"/>
+          <p:cNvSpPr>
+            <a:spLocks noGrp="1"/>
+          </p:cNvSpPr>
+          <p:nvPr>
+            <p:ph type="title"/>
+          </p:nvPr>
+        </p:nvSpPr>
+        <p:spPr/>
+        <p:txBody>
+          <a:bodyPr/>
+          <a:lstStyle/>
+          <a:p>
+            <a:r>
+              <a:rPr lang="en-GB" dirty="0" smtClean="0">
+                <a:latin typeface="+mj-lt"/>
+              </a:rPr>
+              <a:t>The Future of 2D Animation in Unity</a:t>
+            </a:r>
+            <a:endParaRPr lang="en-GB" dirty="0">
+              <a:latin typeface="+mj-lt"/>
+            </a:endParaRPr>
+          </a:p>
+        </p:txBody>
+      </p:sp>
+    </p:spTree>
+    <p:extLst>
+      <p:ext uri="{BB962C8B-B14F-4D97-AF65-F5344CB8AC3E}">
+        <p14:creationId xmlns:p14="http://schemas.microsoft.com/office/powerpoint/2010/main" val="3529912158"/>
+      </p:ext>
+    </p:extLst>
+  </p:cSld>
+  <p:clrMapOvr>
+    <a:masterClrMapping/>
+  </p:clrMapOvr>
+  <p:timing>
+    <p:tnLst>
+      <p:par>
+        <p:cTn id="1" dur="indefinite" restart="never" nodeType="tmRoot"/>
+      </p:par>
+    </p:tnLst>
+  </p:timing>
+</p:sld>
+</file>
+
+<file path=ppt/slides/slide4.xml><?xml version="1.0" encoding="utf-8"?>
+<p:sld xmlns:a="http://schemas.openxmlformats.org/drawingml/2006/main" xmlns:r="http://schemas.openxmlformats.org/officeDocument/2006/relationships" xmlns:p="http://schemas.openxmlformats.org/presentationml/2006/main">
+  <p:cSld>
+    <p:spTree>
+      <p:nvGrpSpPr>
+        <p:cNvPr id="1" name=""/>
+        <p:cNvGrpSpPr/>
+        <p:nvPr/>
+      </p:nvGrpSpPr>
+      <p:grpSpPr>
+        <a:xfrm>
+          <a:off x="0" y="0"/>
+          <a:ext cx="0" cy="0"/>
+          <a:chOff x="0" y="0"/>
+          <a:chExt cx="0" cy="0"/>
+        </a:xfrm>
+      </p:grpSpPr>
+      <p:sp>
+        <p:nvSpPr>
           <p:cNvPr id="3" name="Titel 2"/>
           <p:cNvSpPr>
             <a:spLocks noGrp="1"/>
@@ -3815,32 +4370,43 @@
             </a:r>
             <a:r>
               <a:rPr lang="da-DK" b="0" dirty="0" smtClean="0"/>
-              <a:t> </a:t>
-            </a:r>
-            <a:r>
-              <a:rPr lang="da-DK" b="0" dirty="0" err="1" smtClean="0"/>
-              <a:t>Núñez</a:t>
-            </a:r>
-            <a:r>
-              <a:rPr lang="da-DK" b="0" dirty="0" smtClean="0"/>
-              <a:t/>
+              <a:t> Núñez</a:t>
             </a:r>
             <a:br>
               <a:rPr lang="da-DK" b="0" dirty="0" smtClean="0"/>
             </a:br>
             <a:r>
-              <a:rPr lang="da-DK" sz="3200" b="0" dirty="0" smtClean="0"/>
-              <a:t>Product Evangelist, </a:t>
-            </a:r>
-            <a:r>
-              <a:rPr lang="da-DK" sz="3200" b="0" dirty="0" err="1" smtClean="0"/>
-              <a:t>Unity</a:t>
-            </a:r>
-            <a:r>
-              <a:rPr lang="da-DK" sz="3200" b="0" dirty="0" smtClean="0"/>
-              <a:t> Technologies</a:t>
-            </a:r>
-            <a:endParaRPr lang="da-DK" sz="3200" b="0" dirty="0"/>
+              <a:rPr lang="da-DK" sz="2800" b="0" dirty="0" smtClean="0">
+                <a:latin typeface="+mj-lt"/>
+              </a:rPr>
+              <a:t>Product Evangelist, Unity </a:t>
+            </a:r>
+            <a:r>
+              <a:rPr lang="da-DK" sz="2800" b="0" dirty="0" smtClean="0">
+                <a:latin typeface="+mj-lt"/>
+              </a:rPr>
+              <a:t>Technologies</a:t>
+            </a:r>
+            <a:r>
+              <a:rPr lang="da-DK" sz="3200" b="0" dirty="0" smtClean="0">
+                <a:latin typeface="+mj-lt"/>
+              </a:rPr>
+              <a:t/>
+            </a:r>
+            <a:br>
+              <a:rPr lang="da-DK" sz="3200" b="0" dirty="0" smtClean="0">
+                <a:latin typeface="+mj-lt"/>
+              </a:rPr>
+            </a:br>
+            <a:r>
+              <a:rPr lang="da-DK" sz="2400" b="0" dirty="0" smtClean="0">
+                <a:latin typeface="+mj-lt"/>
+              </a:rPr>
+              <a:t>@ArturoNereu</a:t>
+            </a:r>
+            <a:endParaRPr lang="da-DK" sz="2400" b="0" dirty="0">
+              <a:latin typeface="+mj-lt"/>
+            </a:endParaRPr>
           </a:p>
         </p:txBody>
       </p:sp>
@@ -3872,70 +4438,6 @@
 </p:sld>
 </file>
 
-<file path=ppt/slides/slide4.xml><?xml version="1.0" encoding="utf-8"?>
-<p:sld xmlns:a="http://schemas.openxmlformats.org/drawingml/2006/main" xmlns:r="http://schemas.openxmlformats.org/officeDocument/2006/relationships" xmlns:p="http://schemas.openxmlformats.org/presentationml/2006/main">
-  <p:cSld>
-    <p:spTree>
-      <p:nvGrpSpPr>
-        <p:cNvPr id="1" name=""/>
-        <p:cNvGrpSpPr/>
-        <p:nvPr/>
-      </p:nvGrpSpPr>
-      <p:grpSpPr>
-        <a:xfrm>
-          <a:off x="0" y="0"/>
-          <a:ext cx="0" cy="0"/>
-          <a:chOff x="0" y="0"/>
-          <a:chExt cx="0" cy="0"/>
-        </a:xfrm>
-      </p:grpSpPr>
-      <p:sp>
-        <p:nvSpPr>
-          <p:cNvPr id="2" name="Title 1"/>
-          <p:cNvSpPr>
-            <a:spLocks noGrp="1"/>
-          </p:cNvSpPr>
-          <p:nvPr>
-            <p:ph type="title"/>
-          </p:nvPr>
-        </p:nvSpPr>
-        <p:spPr/>
-        <p:txBody>
-          <a:bodyPr/>
-          <a:lstStyle/>
-          <a:p>
-            <a:r>
-              <a:rPr lang="en-GB" dirty="0" smtClean="0">
-                <a:latin typeface="+mj-lt"/>
-              </a:rPr>
-              <a:t>The Future of 2D Animation in Unity</a:t>
-            </a:r>
-            <a:endParaRPr lang="en-GB" dirty="0">
-              <a:latin typeface="+mj-lt"/>
-            </a:endParaRPr>
-          </a:p>
-        </p:txBody>
-      </p:sp>
-    </p:spTree>
-    <p:extLst>
-      <p:ext uri="{BB962C8B-B14F-4D97-AF65-F5344CB8AC3E}">
-        <p14:creationId xmlns:p14="http://schemas.microsoft.com/office/powerpoint/2010/main" val="3529912158"/>
-      </p:ext>
-    </p:extLst>
-  </p:cSld>
-  <p:clrMapOvr>
-    <a:masterClrMapping/>
-  </p:clrMapOvr>
-  <p:timing>
-    <p:tnLst>
-      <p:par>
-        <p:cTn id="1" dur="indefinite" restart="never" nodeType="tmRoot"/>
-      </p:par>
-    </p:tnLst>
-  </p:timing>
-</p:sld>
-</file>
-
 <file path=ppt/slides/slide5.xml><?xml version="1.0" encoding="utf-8"?>
 <p:sld xmlns:a="http://schemas.openxmlformats.org/drawingml/2006/main" xmlns:r="http://schemas.openxmlformats.org/officeDocument/2006/relationships" xmlns:p="http://schemas.openxmlformats.org/presentationml/2006/main">
   <p:cSld>
@@ -3969,18 +4471,14 @@
           <a:lstStyle/>
           <a:p>
             <a:r>
-              <a:rPr lang="en-GB" dirty="0" smtClean="0"/>
-              <a:t>Headline can go in two lines if necessary and will </a:t>
-            </a:r>
-            <a:r>
-              <a:rPr lang="en-GB" dirty="0" err="1" smtClean="0"/>
-              <a:t>center</a:t>
-            </a:r>
-            <a:r>
-              <a:rPr lang="en-GB" dirty="0" smtClean="0"/>
-              <a:t>-align vertically.</a:t>
-            </a:r>
-            <a:endParaRPr lang="en-GB" dirty="0"/>
+              <a:rPr lang="en-GB" dirty="0" smtClean="0">
+                <a:latin typeface="+mj-lt"/>
+              </a:rPr>
+              <a:t>Objectives</a:t>
+            </a:r>
+            <a:endParaRPr lang="en-GB" dirty="0">
+              <a:latin typeface="+mj-lt"/>
+            </a:endParaRPr>
           </a:p>
         </p:txBody>
       </p:sp>
@@ -3999,14 +4497,69 @@
           <a:bodyPr/>
           <a:lstStyle/>
           <a:p>
-            <a:endParaRPr lang="en-GB" dirty="0" smtClean="0"/>
+            <a:pPr marL="0" indent="0">
+              <a:buNone/>
+            </a:pPr>
+            <a:r>
+              <a:rPr lang="en-GB" sz="2400" dirty="0" smtClean="0"/>
+              <a:t>At the end of the presentation, you will be able to:</a:t>
+            </a:r>
+          </a:p>
+          <a:p>
+            <a:pPr marL="0" indent="0">
+              <a:buNone/>
+            </a:pPr>
+            <a:endParaRPr lang="en-GB" sz="2200" dirty="0"/>
+          </a:p>
+          <a:p>
+            <a:r>
+              <a:rPr lang="en-GB" sz="2400" dirty="0" smtClean="0">
+                <a:latin typeface="+mj-lt"/>
+              </a:rPr>
+              <a:t>Select the best animation technique for your game based on artistic and technical constraints.</a:t>
+            </a:r>
+          </a:p>
+          <a:p>
+            <a:pPr marL="0" indent="0">
+              <a:buNone/>
+            </a:pPr>
+            <a:endParaRPr lang="en-GB" sz="2400" dirty="0" smtClean="0">
+              <a:latin typeface="+mj-lt"/>
+            </a:endParaRPr>
+          </a:p>
+          <a:p>
+            <a:r>
+              <a:rPr lang="en-GB" sz="2400" dirty="0" smtClean="0">
+                <a:latin typeface="+mj-lt"/>
+              </a:rPr>
+              <a:t> Animate a 2D humanoid character in Unity using Anima2D.</a:t>
+            </a:r>
+          </a:p>
+          <a:p>
+            <a:pPr marL="0" indent="0">
+              <a:buNone/>
+            </a:pPr>
+            <a:endParaRPr lang="en-GB" sz="2400" dirty="0" smtClean="0">
+              <a:latin typeface="+mj-lt"/>
+            </a:endParaRPr>
+          </a:p>
+          <a:p>
+            <a:r>
+              <a:rPr lang="en-GB" sz="2400" dirty="0" smtClean="0">
+                <a:latin typeface="+mj-lt"/>
+              </a:rPr>
+              <a:t>Understand where Unity 2D animation tools are heading to.</a:t>
+            </a:r>
+          </a:p>
+          <a:p>
+            <a:endParaRPr lang="en-GB" sz="2200" dirty="0" smtClean="0"/>
           </a:p>
         </p:txBody>
       </p:sp>
     </p:spTree>
     <p:extLst>
       <p:ext uri="{BB962C8B-B14F-4D97-AF65-F5344CB8AC3E}">
-        <p14:creationId xmlns:p14="http://schemas.microsoft.com/office/powerpoint/2010/main" val="157880635"/>
+        <p14:creationId xmlns:p14="http://schemas.microsoft.com/office/powerpoint/2010/main" val="2717482734"/>
       </p:ext>
     </p:extLst>
   </p:cSld>
@@ -4090,44 +4643,68 @@
           <a:bodyPr/>
           <a:lstStyle/>
           <a:p>
-            <a:endParaRPr lang="en-GB" dirty="0" smtClean="0"/>
-          </a:p>
-          <a:p>
-            <a:r>
-              <a:rPr lang="en-GB" dirty="0" smtClean="0"/>
+            <a:endParaRPr lang="en-GB" dirty="0" smtClean="0">
+              <a:latin typeface="+mj-lt"/>
+            </a:endParaRPr>
+          </a:p>
+          <a:p>
+            <a:r>
+              <a:rPr lang="en-GB" dirty="0" smtClean="0">
+                <a:latin typeface="+mj-lt"/>
+              </a:rPr>
               <a:t>Unity 2D Animation in the Past.</a:t>
             </a:r>
           </a:p>
           <a:p>
             <a:r>
-              <a:rPr lang="en-GB" dirty="0" smtClean="0"/>
-              <a:t>Frame by Frame Animation VS. </a:t>
-            </a:r>
-            <a:r>
-              <a:rPr lang="en-GB" smtClean="0"/>
-              <a:t>Skeletal Animation</a:t>
-            </a:r>
-            <a:endParaRPr lang="en-GB" dirty="0"/>
-          </a:p>
-          <a:p>
-            <a:r>
-              <a:rPr lang="en-GB" dirty="0" smtClean="0"/>
+              <a:rPr lang="en-GB" dirty="0" smtClean="0">
+                <a:latin typeface="+mj-lt"/>
+              </a:rPr>
+              <a:t>Frame by Frame Animation VS. Skeletal Animation</a:t>
+            </a:r>
+            <a:endParaRPr lang="en-GB" dirty="0">
+              <a:latin typeface="+mj-lt"/>
+            </a:endParaRPr>
+          </a:p>
+          <a:p>
+            <a:r>
+              <a:rPr lang="en-GB" dirty="0" smtClean="0">
+                <a:latin typeface="+mj-lt"/>
+              </a:rPr>
               <a:t>Anima2D Demo</a:t>
             </a:r>
           </a:p>
           <a:p>
             <a:r>
-              <a:rPr lang="en-GB" dirty="0" smtClean="0"/>
+              <a:rPr lang="en-GB" dirty="0" smtClean="0">
+                <a:latin typeface="+mj-lt"/>
+              </a:rPr>
               <a:t>Native </a:t>
             </a:r>
             <a:r>
-              <a:rPr lang="en-GB" dirty="0"/>
-              <a:t>Animation tool sneak peek</a:t>
-            </a:r>
-          </a:p>
-          <a:p>
-            <a:r>
-              <a:rPr lang="en-GB" dirty="0" smtClean="0"/>
+              <a:rPr lang="en-GB" dirty="0">
+                <a:latin typeface="+mj-lt"/>
+              </a:rPr>
+              <a:t>Animation </a:t>
+            </a:r>
+            <a:r>
+              <a:rPr lang="en-GB" dirty="0" smtClean="0">
+                <a:latin typeface="+mj-lt"/>
+              </a:rPr>
+              <a:t>tools </a:t>
+            </a:r>
+            <a:r>
+              <a:rPr lang="en-GB" dirty="0">
+                <a:latin typeface="+mj-lt"/>
+              </a:rPr>
+              <a:t>sneak peek</a:t>
+            </a:r>
+          </a:p>
+          <a:p>
+            <a:r>
+              <a:rPr lang="en-GB" dirty="0" smtClean="0">
+                <a:latin typeface="+mj-lt"/>
+              </a:rPr>
               <a:t>Q &amp; A</a:t>
             </a:r>
           </a:p>
@@ -4136,7 +4713,7 @@
     </p:spTree>
     <p:extLst>
       <p:ext uri="{BB962C8B-B14F-4D97-AF65-F5344CB8AC3E}">
-        <p14:creationId xmlns:p14="http://schemas.microsoft.com/office/powerpoint/2010/main" val="2717482734"/>
+        <p14:creationId xmlns:p14="http://schemas.microsoft.com/office/powerpoint/2010/main" val="1566728119"/>
       </p:ext>
     </p:extLst>
   </p:cSld>
@@ -4188,7 +4765,12 @@
             <p:ph type="title"/>
           </p:nvPr>
         </p:nvSpPr>
-        <p:spPr/>
+        <p:spPr>
+          <a:xfrm>
+            <a:off x="1060995" y="1330058"/>
+            <a:ext cx="1815113" cy="631726"/>
+          </a:xfrm>
+        </p:spPr>
         <p:txBody>
           <a:bodyPr/>
           <a:lstStyle/>
@@ -4197,9 +4779,44 @@
               <a:rPr lang="en-GB" dirty="0" smtClean="0">
                 <a:latin typeface="+mj-lt"/>
               </a:rPr>
-              <a:t>Anima2D Demo</a:t>
+              <a:t>Animation</a:t>
             </a:r>
             <a:endParaRPr lang="en-GB" dirty="0">
+              <a:latin typeface="+mj-lt"/>
+            </a:endParaRPr>
+          </a:p>
+        </p:txBody>
+      </p:sp>
+      <p:sp>
+        <p:nvSpPr>
+          <p:cNvPr id="6" name="Text Placeholder 5"/>
+          <p:cNvSpPr>
+            <a:spLocks noGrp="1"/>
+          </p:cNvSpPr>
+          <p:nvPr>
+            <p:ph type="body" sz="quarter" idx="10"/>
+          </p:nvPr>
+        </p:nvSpPr>
+        <p:spPr>
+          <a:xfrm>
+            <a:off x="550632" y="1807612"/>
+            <a:ext cx="7740000" cy="1586019"/>
+          </a:xfrm>
+        </p:spPr>
+        <p:txBody>
+          <a:bodyPr anchor="ctr"/>
+          <a:lstStyle/>
+          <a:p>
+            <a:pPr marL="0" indent="0" algn="ctr">
+              <a:buNone/>
+            </a:pPr>
+            <a:r>
+              <a:rPr lang="en-GB" sz="5400" dirty="0" smtClean="0">
+                <a:latin typeface="+mj-lt"/>
+              </a:rPr>
+              <a:t>The Illusion of Life</a:t>
+            </a:r>
+            <a:endParaRPr lang="en-GB" sz="5400" dirty="0" smtClean="0">
               <a:latin typeface="+mj-lt"/>
             </a:endParaRPr>
           </a:p>
@@ -4214,7 +4831,7 @@
           <p:nvPr/>
         </p:nvPicPr>
         <p:blipFill>
-          <a:blip r:embed="rId3" cstate="print">
+          <a:blip r:embed="rId3">
             <a:extLst>
               <a:ext uri="{28A0092B-C50C-407E-A947-70E740481C1C}">
                 <a14:useLocalDpi xmlns:a14="http://schemas.microsoft.com/office/drawing/2010/main" val="0"/>
@@ -4227,8 +4844,8 @@
         </p:blipFill>
         <p:spPr>
           <a:xfrm>
-            <a:off x="3210846" y="1419446"/>
-            <a:ext cx="2398307" cy="3197742"/>
+            <a:off x="3753844" y="3094075"/>
+            <a:ext cx="1333575" cy="1333575"/>
           </a:xfrm>
           <a:prstGeom prst="rect">
             <a:avLst/>
@@ -4238,7 +4855,7 @@
     </p:spTree>
     <p:extLst>
       <p:ext uri="{BB962C8B-B14F-4D97-AF65-F5344CB8AC3E}">
-        <p14:creationId xmlns:p14="http://schemas.microsoft.com/office/powerpoint/2010/main" val="3379711719"/>
+        <p14:creationId xmlns:p14="http://schemas.microsoft.com/office/powerpoint/2010/main" val="4212999759"/>
       </p:ext>
     </p:extLst>
   </p:cSld>
@@ -4282,7 +4899,7 @@
       </p:grpSpPr>
       <p:sp>
         <p:nvSpPr>
-          <p:cNvPr id="5" name="Title 4"/>
+          <p:cNvPr id="2" name="Title 1"/>
           <p:cNvSpPr>
             <a:spLocks noGrp="1"/>
           </p:cNvSpPr>
@@ -4296,12 +4913,12 @@
           <a:lstStyle/>
           <a:p>
             <a:r>
-              <a:rPr lang="en-GB" dirty="0" smtClean="0">
+              <a:rPr lang="en-US" dirty="0" smtClean="0">
                 <a:latin typeface="+mj-lt"/>
               </a:rPr>
-              <a:t>Sneak Peek of the native animation tools</a:t>
-            </a:r>
-            <a:endParaRPr lang="en-GB" dirty="0">
+              <a:t>Frame by Frame Animation</a:t>
+            </a:r>
+            <a:endParaRPr lang="en-US" dirty="0">
               <a:latin typeface="+mj-lt"/>
             </a:endParaRPr>
           </a:p>
@@ -4309,7 +4926,7 @@
       </p:sp>
       <p:sp>
         <p:nvSpPr>
-          <p:cNvPr id="6" name="Text Placeholder 5"/>
+          <p:cNvPr id="3" name="Text Placeholder 2"/>
           <p:cNvSpPr>
             <a:spLocks noGrp="1"/>
           </p:cNvSpPr>
@@ -4322,14 +4939,14 @@
           <a:bodyPr/>
           <a:lstStyle/>
           <a:p>
-            <a:endParaRPr lang="en-GB" dirty="0" smtClean="0"/>
+            <a:endParaRPr lang="en-US"/>
           </a:p>
         </p:txBody>
       </p:sp>
     </p:spTree>
     <p:extLst>
       <p:ext uri="{BB962C8B-B14F-4D97-AF65-F5344CB8AC3E}">
-        <p14:creationId xmlns:p14="http://schemas.microsoft.com/office/powerpoint/2010/main" val="2098284041"/>
+        <p14:creationId xmlns:p14="http://schemas.microsoft.com/office/powerpoint/2010/main" val="4034782168"/>
       </p:ext>
     </p:extLst>
   </p:cSld>
@@ -4344,13 +4961,6 @@
       <p:transition spd="slow"/>
     </mc:Fallback>
   </mc:AlternateContent>
-  <p:timing>
-    <p:tnLst>
-      <p:par>
-        <p:cTn id="1" dur="indefinite" restart="never" nodeType="tmRoot"/>
-      </p:par>
-    </p:tnLst>
-  </p:timing>
 </p:sld>
 </file>
 
@@ -4373,7 +4983,7 @@
       </p:grpSpPr>
       <p:sp>
         <p:nvSpPr>
-          <p:cNvPr id="5" name="Title 4"/>
+          <p:cNvPr id="2" name="Title 1"/>
           <p:cNvSpPr>
             <a:spLocks noGrp="1"/>
           </p:cNvSpPr>
@@ -4387,12 +4997,12 @@
           <a:lstStyle/>
           <a:p>
             <a:r>
-              <a:rPr lang="en-GB" dirty="0" smtClean="0">
+              <a:rPr lang="en-US" dirty="0" smtClean="0">
                 <a:latin typeface="+mj-lt"/>
               </a:rPr>
-              <a:t>References</a:t>
-            </a:r>
-            <a:endParaRPr lang="en-GB" dirty="0">
+              <a:t>Skeletal Based Animation</a:t>
+            </a:r>
+            <a:endParaRPr lang="en-US" dirty="0">
               <a:latin typeface="+mj-lt"/>
             </a:endParaRPr>
           </a:p>
@@ -4400,7 +5010,7 @@
       </p:sp>
       <p:sp>
         <p:nvSpPr>
-          <p:cNvPr id="6" name="Text Placeholder 5"/>
+          <p:cNvPr id="3" name="Text Placeholder 2"/>
           <p:cNvSpPr>
             <a:spLocks noGrp="1"/>
           </p:cNvSpPr>
@@ -4413,53 +5023,14 @@
           <a:bodyPr/>
           <a:lstStyle/>
           <a:p>
-            <a:r>
-              <a:rPr lang="en-GB" dirty="0" smtClean="0"/>
-              <a:t>Slides and demo Project</a:t>
-            </a:r>
-            <a:r>
-              <a:rPr lang="en-GB" dirty="0"/>
-              <a:t>: </a:t>
-            </a:r>
-            <a:endParaRPr lang="en-GB" dirty="0" smtClean="0"/>
-          </a:p>
-          <a:p>
-            <a:pPr lvl="1"/>
-            <a:r>
-              <a:rPr lang="en-GB" sz="1600" dirty="0" smtClean="0"/>
-              <a:t>https</a:t>
-            </a:r>
-            <a:r>
-              <a:rPr lang="en-GB" sz="1600" dirty="0"/>
-              <a:t>://github.com/ArturoNereu/Unity2DAnimation</a:t>
-            </a:r>
-            <a:endParaRPr lang="en-GB" dirty="0" smtClean="0"/>
-          </a:p>
-          <a:p>
-            <a:r>
-              <a:rPr lang="en-GB" dirty="0" smtClean="0"/>
-              <a:t>Anima2D </a:t>
-            </a:r>
-            <a:r>
-              <a:rPr lang="en-GB" dirty="0"/>
-              <a:t>Package: </a:t>
-            </a:r>
-            <a:endParaRPr lang="en-GB" dirty="0" smtClean="0"/>
-          </a:p>
-          <a:p>
-            <a:pPr lvl="1"/>
-            <a:r>
-              <a:rPr lang="en-GB" sz="1600" dirty="0"/>
-              <a:t>https://www.assetstore.unity3d.com/#!/content/79840</a:t>
-            </a:r>
-            <a:endParaRPr lang="en-GB" sz="1600" dirty="0" smtClean="0"/>
+            <a:endParaRPr lang="en-US"/>
           </a:p>
         </p:txBody>
       </p:sp>
     </p:spTree>
     <p:extLst>
       <p:ext uri="{BB962C8B-B14F-4D97-AF65-F5344CB8AC3E}">
-        <p14:creationId xmlns:p14="http://schemas.microsoft.com/office/powerpoint/2010/main" val="1887431108"/>
+        <p14:creationId xmlns:p14="http://schemas.microsoft.com/office/powerpoint/2010/main" val="975164728"/>
       </p:ext>
     </p:extLst>
   </p:cSld>
@@ -4474,13 +5045,6 @@
       <p:transition spd="slow"/>
     </mc:Fallback>
   </mc:AlternateContent>
-  <p:timing>
-    <p:tnLst>
-      <p:par>
-        <p:cTn id="1" dur="indefinite" restart="never" nodeType="tmRoot"/>
-      </p:par>
-    </p:tnLst>
-  </p:timing>
 </p:sld>
 </file>
 

</xml_diff>

<commit_message>
PPT V0.3 added. Plus Anima2D files for demo project.
</commit_message>
<xml_diff>
--- a/Presentations/Future2DAnim_Tokyo.pptx
+++ b/Presentations/Future2DAnim_Tokyo.pptx
@@ -5,10 +5,10 @@
     <p:sldMasterId id="2147483648" r:id="rId1"/>
   </p:sldMasterIdLst>
   <p:notesMasterIdLst>
-    <p:notesMasterId r:id="rId16"/>
+    <p:notesMasterId r:id="rId20"/>
   </p:notesMasterIdLst>
   <p:handoutMasterIdLst>
-    <p:handoutMasterId r:id="rId17"/>
+    <p:handoutMasterId r:id="rId21"/>
   </p:handoutMasterIdLst>
   <p:sldIdLst>
     <p:sldId id="283" r:id="rId2"/>
@@ -20,11 +20,15 @@
     <p:sldId id="290" r:id="rId8"/>
     <p:sldId id="291" r:id="rId9"/>
     <p:sldId id="292" r:id="rId10"/>
-    <p:sldId id="287" r:id="rId11"/>
-    <p:sldId id="288" r:id="rId12"/>
-    <p:sldId id="285" r:id="rId13"/>
-    <p:sldId id="276" r:id="rId14"/>
-    <p:sldId id="284" r:id="rId15"/>
+    <p:sldId id="293" r:id="rId11"/>
+    <p:sldId id="294" r:id="rId12"/>
+    <p:sldId id="295" r:id="rId13"/>
+    <p:sldId id="296" r:id="rId14"/>
+    <p:sldId id="287" r:id="rId15"/>
+    <p:sldId id="288" r:id="rId16"/>
+    <p:sldId id="285" r:id="rId17"/>
+    <p:sldId id="276" r:id="rId18"/>
+    <p:sldId id="284" r:id="rId19"/>
   </p:sldIdLst>
   <p:sldSz cx="9144000" cy="5143500" type="screen16x9"/>
   <p:notesSz cx="6858000" cy="9144000"/>
@@ -600,6 +604,390 @@
           <a:p>
             <a:r>
               <a:rPr lang="en-GB" dirty="0" smtClean="0"/>
+              <a:t>In this part, I will show a demo using Unity (the software)</a:t>
+            </a:r>
+            <a:r>
+              <a:rPr lang="en-GB" baseline="0" dirty="0" smtClean="0"/>
+              <a:t> to Rig, Animate and Move a character using the Anima2D Animation Tool. </a:t>
+            </a:r>
+          </a:p>
+          <a:p>
+            <a:r>
+              <a:rPr lang="en-GB" baseline="0" dirty="0" smtClean="0"/>
+              <a:t>I’m still working on the Assets but, key important things to know are: Bones, Vertices, Attachments, Timeline, </a:t>
+            </a:r>
+            <a:r>
+              <a:rPr lang="en-GB" baseline="0" dirty="0" err="1" smtClean="0"/>
+              <a:t>Dopesheet</a:t>
+            </a:r>
+            <a:r>
+              <a:rPr lang="en-GB" baseline="0" dirty="0" smtClean="0"/>
+              <a:t>, IK, animation curve and interpolation.</a:t>
+            </a:r>
+            <a:endParaRPr lang="en-GB" dirty="0"/>
+          </a:p>
+        </p:txBody>
+      </p:sp>
+      <p:sp>
+        <p:nvSpPr>
+          <p:cNvPr id="4" name="Slide Number Placeholder 3"/>
+          <p:cNvSpPr>
+            <a:spLocks noGrp="1"/>
+          </p:cNvSpPr>
+          <p:nvPr>
+            <p:ph type="sldNum" sz="quarter" idx="10"/>
+          </p:nvPr>
+        </p:nvSpPr>
+        <p:spPr/>
+        <p:txBody>
+          <a:bodyPr/>
+          <a:lstStyle/>
+          <a:p>
+            <a:fld id="{49436F85-577F-4A92-A47F-D540A2BCC821}" type="slidenum">
+              <a:rPr lang="en-GB" smtClean="0"/>
+              <a:pPr/>
+              <a:t>14</a:t>
+            </a:fld>
+            <a:endParaRPr lang="en-GB" dirty="0"/>
+          </a:p>
+        </p:txBody>
+      </p:sp>
+    </p:spTree>
+    <p:extLst>
+      <p:ext uri="{BB962C8B-B14F-4D97-AF65-F5344CB8AC3E}">
+        <p14:creationId xmlns:p14="http://schemas.microsoft.com/office/powerpoint/2010/main" val="2342777617"/>
+      </p:ext>
+    </p:extLst>
+  </p:cSld>
+  <p:clrMapOvr>
+    <a:masterClrMapping/>
+  </p:clrMapOvr>
+</p:notes>
+</file>
+
+<file path=ppt/notesSlides/notesSlide11.xml><?xml version="1.0" encoding="utf-8"?>
+<p:notes xmlns:a="http://schemas.openxmlformats.org/drawingml/2006/main" xmlns:r="http://schemas.openxmlformats.org/officeDocument/2006/relationships" xmlns:p="http://schemas.openxmlformats.org/presentationml/2006/main">
+  <p:cSld>
+    <p:spTree>
+      <p:nvGrpSpPr>
+        <p:cNvPr id="1" name=""/>
+        <p:cNvGrpSpPr/>
+        <p:nvPr/>
+      </p:nvGrpSpPr>
+      <p:grpSpPr>
+        <a:xfrm>
+          <a:off x="0" y="0"/>
+          <a:ext cx="0" cy="0"/>
+          <a:chOff x="0" y="0"/>
+          <a:chExt cx="0" cy="0"/>
+        </a:xfrm>
+      </p:grpSpPr>
+      <p:sp>
+        <p:nvSpPr>
+          <p:cNvPr id="2" name="Slide Image Placeholder 1"/>
+          <p:cNvSpPr>
+            <a:spLocks noGrp="1" noRot="1" noChangeAspect="1"/>
+          </p:cNvSpPr>
+          <p:nvPr>
+            <p:ph type="sldImg"/>
+          </p:nvPr>
+        </p:nvSpPr>
+        <p:spPr/>
+      </p:sp>
+      <p:sp>
+        <p:nvSpPr>
+          <p:cNvPr id="3" name="Notes Placeholder 2"/>
+          <p:cNvSpPr>
+            <a:spLocks noGrp="1"/>
+          </p:cNvSpPr>
+          <p:nvPr>
+            <p:ph type="body" idx="1"/>
+          </p:nvPr>
+        </p:nvSpPr>
+        <p:spPr/>
+        <p:txBody>
+          <a:bodyPr/>
+          <a:lstStyle/>
+          <a:p>
+            <a:r>
+              <a:rPr lang="en-GB" dirty="0" smtClean="0"/>
+              <a:t>Here, I will show videos that</a:t>
+            </a:r>
+            <a:r>
+              <a:rPr lang="en-GB" baseline="0" dirty="0" smtClean="0"/>
+              <a:t> demonstrates the progress of the native Animation tool for 2D in Unity. I’m waiting for the material but the examples here will be similar to what I showed in the demo, the difference is that they will now be integrated in the software and not via an external plugin as it is now.</a:t>
+            </a:r>
+            <a:endParaRPr lang="en-GB" dirty="0"/>
+          </a:p>
+        </p:txBody>
+      </p:sp>
+      <p:sp>
+        <p:nvSpPr>
+          <p:cNvPr id="4" name="Slide Number Placeholder 3"/>
+          <p:cNvSpPr>
+            <a:spLocks noGrp="1"/>
+          </p:cNvSpPr>
+          <p:nvPr>
+            <p:ph type="sldNum" sz="quarter" idx="10"/>
+          </p:nvPr>
+        </p:nvSpPr>
+        <p:spPr/>
+        <p:txBody>
+          <a:bodyPr/>
+          <a:lstStyle/>
+          <a:p>
+            <a:fld id="{49436F85-577F-4A92-A47F-D540A2BCC821}" type="slidenum">
+              <a:rPr lang="en-GB" smtClean="0"/>
+              <a:pPr/>
+              <a:t>15</a:t>
+            </a:fld>
+            <a:endParaRPr lang="en-GB" dirty="0"/>
+          </a:p>
+        </p:txBody>
+      </p:sp>
+    </p:spTree>
+    <p:extLst>
+      <p:ext uri="{BB962C8B-B14F-4D97-AF65-F5344CB8AC3E}">
+        <p14:creationId xmlns:p14="http://schemas.microsoft.com/office/powerpoint/2010/main" val="8296490"/>
+      </p:ext>
+    </p:extLst>
+  </p:cSld>
+  <p:clrMapOvr>
+    <a:masterClrMapping/>
+  </p:clrMapOvr>
+</p:notes>
+</file>
+
+<file path=ppt/notesSlides/notesSlide12.xml><?xml version="1.0" encoding="utf-8"?>
+<p:notes xmlns:a="http://schemas.openxmlformats.org/drawingml/2006/main" xmlns:r="http://schemas.openxmlformats.org/officeDocument/2006/relationships" xmlns:p="http://schemas.openxmlformats.org/presentationml/2006/main">
+  <p:cSld>
+    <p:spTree>
+      <p:nvGrpSpPr>
+        <p:cNvPr id="1" name=""/>
+        <p:cNvGrpSpPr/>
+        <p:nvPr/>
+      </p:nvGrpSpPr>
+      <p:grpSpPr>
+        <a:xfrm>
+          <a:off x="0" y="0"/>
+          <a:ext cx="0" cy="0"/>
+          <a:chOff x="0" y="0"/>
+          <a:chExt cx="0" cy="0"/>
+        </a:xfrm>
+      </p:grpSpPr>
+      <p:sp>
+        <p:nvSpPr>
+          <p:cNvPr id="2" name="Slide Image Placeholder 1"/>
+          <p:cNvSpPr>
+            <a:spLocks noGrp="1" noRot="1" noChangeAspect="1"/>
+          </p:cNvSpPr>
+          <p:nvPr>
+            <p:ph type="sldImg"/>
+          </p:nvPr>
+        </p:nvSpPr>
+        <p:spPr/>
+      </p:sp>
+      <p:sp>
+        <p:nvSpPr>
+          <p:cNvPr id="3" name="Notes Placeholder 2"/>
+          <p:cNvSpPr>
+            <a:spLocks noGrp="1"/>
+          </p:cNvSpPr>
+          <p:nvPr>
+            <p:ph type="body" idx="1"/>
+          </p:nvPr>
+        </p:nvSpPr>
+        <p:spPr/>
+        <p:txBody>
+          <a:bodyPr/>
+          <a:lstStyle/>
+          <a:p>
+            <a:endParaRPr lang="en-GB"/>
+          </a:p>
+        </p:txBody>
+      </p:sp>
+      <p:sp>
+        <p:nvSpPr>
+          <p:cNvPr id="4" name="Slide Number Placeholder 3"/>
+          <p:cNvSpPr>
+            <a:spLocks noGrp="1"/>
+          </p:cNvSpPr>
+          <p:nvPr>
+            <p:ph type="sldNum" sz="quarter" idx="10"/>
+          </p:nvPr>
+        </p:nvSpPr>
+        <p:spPr/>
+        <p:txBody>
+          <a:bodyPr/>
+          <a:lstStyle/>
+          <a:p>
+            <a:fld id="{49436F85-577F-4A92-A47F-D540A2BCC821}" type="slidenum">
+              <a:rPr lang="en-GB" smtClean="0"/>
+              <a:pPr/>
+              <a:t>16</a:t>
+            </a:fld>
+            <a:endParaRPr lang="en-GB" dirty="0"/>
+          </a:p>
+        </p:txBody>
+      </p:sp>
+    </p:spTree>
+    <p:extLst>
+      <p:ext uri="{BB962C8B-B14F-4D97-AF65-F5344CB8AC3E}">
+        <p14:creationId xmlns:p14="http://schemas.microsoft.com/office/powerpoint/2010/main" val="3231049928"/>
+      </p:ext>
+    </p:extLst>
+  </p:cSld>
+  <p:clrMapOvr>
+    <a:masterClrMapping/>
+  </p:clrMapOvr>
+</p:notes>
+</file>
+
+<file path=ppt/notesSlides/notesSlide13.xml><?xml version="1.0" encoding="utf-8"?>
+<p:notes xmlns:a="http://schemas.openxmlformats.org/drawingml/2006/main" xmlns:r="http://schemas.openxmlformats.org/officeDocument/2006/relationships" xmlns:p="http://schemas.openxmlformats.org/presentationml/2006/main">
+  <p:cSld>
+    <p:spTree>
+      <p:nvGrpSpPr>
+        <p:cNvPr id="1" name=""/>
+        <p:cNvGrpSpPr/>
+        <p:nvPr/>
+      </p:nvGrpSpPr>
+      <p:grpSpPr>
+        <a:xfrm>
+          <a:off x="0" y="0"/>
+          <a:ext cx="0" cy="0"/>
+          <a:chOff x="0" y="0"/>
+          <a:chExt cx="0" cy="0"/>
+        </a:xfrm>
+      </p:grpSpPr>
+      <p:sp>
+        <p:nvSpPr>
+          <p:cNvPr id="2" name="Slide Image Placeholder 1"/>
+          <p:cNvSpPr>
+            <a:spLocks noGrp="1" noRot="1" noChangeAspect="1"/>
+          </p:cNvSpPr>
+          <p:nvPr>
+            <p:ph type="sldImg"/>
+          </p:nvPr>
+        </p:nvSpPr>
+        <p:spPr/>
+      </p:sp>
+      <p:sp>
+        <p:nvSpPr>
+          <p:cNvPr id="3" name="Notes Placeholder 2"/>
+          <p:cNvSpPr>
+            <a:spLocks noGrp="1"/>
+          </p:cNvSpPr>
+          <p:nvPr>
+            <p:ph type="body" idx="1"/>
+          </p:nvPr>
+        </p:nvSpPr>
+        <p:spPr/>
+        <p:txBody>
+          <a:bodyPr/>
+          <a:lstStyle/>
+          <a:p>
+            <a:r>
+              <a:rPr lang="en-US" dirty="0" smtClean="0"/>
+              <a:t>Q&amp;A</a:t>
+            </a:r>
+            <a:endParaRPr lang="en-US" baseline="0" dirty="0" smtClean="0"/>
+          </a:p>
+          <a:p>
+            <a:endParaRPr lang="en-US" baseline="0" dirty="0" smtClean="0"/>
+          </a:p>
+          <a:p>
+            <a:r>
+              <a:rPr lang="en-US" baseline="0" dirty="0" smtClean="0"/>
+              <a:t>Note for Translator: How do I say Q&amp;A in Japanese?</a:t>
+            </a:r>
+            <a:endParaRPr lang="en-GB" dirty="0"/>
+          </a:p>
+        </p:txBody>
+      </p:sp>
+      <p:sp>
+        <p:nvSpPr>
+          <p:cNvPr id="4" name="Slide Number Placeholder 3"/>
+          <p:cNvSpPr>
+            <a:spLocks noGrp="1"/>
+          </p:cNvSpPr>
+          <p:nvPr>
+            <p:ph type="sldNum" sz="quarter" idx="10"/>
+          </p:nvPr>
+        </p:nvSpPr>
+        <p:spPr/>
+        <p:txBody>
+          <a:bodyPr/>
+          <a:lstStyle/>
+          <a:p>
+            <a:fld id="{49436F85-577F-4A92-A47F-D540A2BCC821}" type="slidenum">
+              <a:rPr lang="en-GB" smtClean="0"/>
+              <a:pPr/>
+              <a:t>17</a:t>
+            </a:fld>
+            <a:endParaRPr lang="en-GB" dirty="0"/>
+          </a:p>
+        </p:txBody>
+      </p:sp>
+    </p:spTree>
+    <p:extLst>
+      <p:ext uri="{BB962C8B-B14F-4D97-AF65-F5344CB8AC3E}">
+        <p14:creationId xmlns:p14="http://schemas.microsoft.com/office/powerpoint/2010/main" val="947654780"/>
+      </p:ext>
+    </p:extLst>
+  </p:cSld>
+  <p:clrMapOvr>
+    <a:masterClrMapping/>
+  </p:clrMapOvr>
+</p:notes>
+</file>
+
+<file path=ppt/notesSlides/notesSlide14.xml><?xml version="1.0" encoding="utf-8"?>
+<p:notes xmlns:a="http://schemas.openxmlformats.org/drawingml/2006/main" xmlns:r="http://schemas.openxmlformats.org/officeDocument/2006/relationships" xmlns:p="http://schemas.openxmlformats.org/presentationml/2006/main">
+  <p:cSld>
+    <p:spTree>
+      <p:nvGrpSpPr>
+        <p:cNvPr id="1" name=""/>
+        <p:cNvGrpSpPr/>
+        <p:nvPr/>
+      </p:nvGrpSpPr>
+      <p:grpSpPr>
+        <a:xfrm>
+          <a:off x="0" y="0"/>
+          <a:ext cx="0" cy="0"/>
+          <a:chOff x="0" y="0"/>
+          <a:chExt cx="0" cy="0"/>
+        </a:xfrm>
+      </p:grpSpPr>
+      <p:sp>
+        <p:nvSpPr>
+          <p:cNvPr id="2" name="Slide Image Placeholder 1"/>
+          <p:cNvSpPr>
+            <a:spLocks noGrp="1" noRot="1" noChangeAspect="1"/>
+          </p:cNvSpPr>
+          <p:nvPr>
+            <p:ph type="sldImg"/>
+          </p:nvPr>
+        </p:nvSpPr>
+        <p:spPr/>
+      </p:sp>
+      <p:sp>
+        <p:nvSpPr>
+          <p:cNvPr id="3" name="Notes Placeholder 2"/>
+          <p:cNvSpPr>
+            <a:spLocks noGrp="1"/>
+          </p:cNvSpPr>
+          <p:nvPr>
+            <p:ph type="body" idx="1"/>
+          </p:nvPr>
+        </p:nvSpPr>
+        <p:spPr/>
+        <p:txBody>
+          <a:bodyPr/>
+          <a:lstStyle/>
+          <a:p>
+            <a:r>
+              <a:rPr lang="en-GB" dirty="0" smtClean="0"/>
               <a:t>Thank you! </a:t>
             </a:r>
             <a:r>
@@ -636,7 +1024,7 @@
             <a:fld id="{49436F85-577F-4A92-A47F-D540A2BCC821}" type="slidenum">
               <a:rPr lang="en-GB" smtClean="0"/>
               <a:pPr/>
-              <a:t>14</a:t>
+              <a:t>18</a:t>
             </a:fld>
             <a:endParaRPr lang="en-GB" dirty="0"/>
           </a:p>
@@ -699,6 +1087,43 @@
           <a:bodyPr/>
           <a:lstStyle/>
           <a:p>
+            <a:r>
+              <a:rPr lang="en-GB" dirty="0" smtClean="0"/>
+              <a:t>Good evening,</a:t>
+            </a:r>
+            <a:r>
+              <a:rPr lang="en-GB" baseline="0" dirty="0" smtClean="0"/>
+              <a:t> today we will talk about the future of 2D Animation in Unity. As you may heard, we acquired and made free the Asset Store package: Anima2D. The ultimate goal solve the problem of animating 2D characters and objects in Unity in an efficient way.</a:t>
+            </a:r>
+          </a:p>
+          <a:p>
+            <a:endParaRPr lang="en-GB" baseline="0" dirty="0" smtClean="0"/>
+          </a:p>
+          <a:p>
+            <a:r>
+              <a:rPr lang="en-GB" baseline="0" dirty="0" smtClean="0"/>
+              <a:t>Description for translators:</a:t>
+            </a:r>
+          </a:p>
+          <a:p>
+            <a:r>
+              <a:rPr lang="en-GB" baseline="0" dirty="0" smtClean="0"/>
+              <a:t>This presentation will focus on the 2D animation workflow we have right now in Unity, using the plugin called: “Anima2D”, we will also cover the differences between “Frame by Frame” animation and “Skeletal Animation”, the goal of this part is to know what are the pros and cons of each one.</a:t>
+            </a:r>
+          </a:p>
+          <a:p>
+            <a:endParaRPr lang="en-GB" baseline="0" dirty="0" smtClean="0"/>
+          </a:p>
+          <a:p>
+            <a:r>
+              <a:rPr lang="en-GB" baseline="0" dirty="0" smtClean="0"/>
+              <a:t>I will also demo the setup for a 2D character using the Anima2D plugin, which will consist on opening Unity and setting up objects to create a “rig”, and “animations”.</a:t>
+            </a:r>
+          </a:p>
+          <a:p>
+            <a:endParaRPr lang="en-GB" baseline="0" dirty="0" smtClean="0"/>
+          </a:p>
+          <a:p>
             <a:endParaRPr lang="en-GB" dirty="0"/>
           </a:p>
         </p:txBody>
@@ -785,23 +1210,21 @@
           <a:lstStyle/>
           <a:p>
             <a:r>
-              <a:rPr lang="en-GB" dirty="0" smtClean="0"/>
-              <a:t>Here, we will mention the main objectives of attending the talk. </a:t>
-            </a:r>
-          </a:p>
-          <a:p>
-            <a:endParaRPr lang="en-GB" dirty="0" smtClean="0"/>
-          </a:p>
-          <a:p>
-            <a:r>
-              <a:rPr lang="en-GB" dirty="0" smtClean="0"/>
-              <a:t>Note for translators: Maybe this is the key slide, since we need to make sure that attendees can</a:t>
-            </a:r>
-            <a:r>
-              <a:rPr lang="en-GB" baseline="0" dirty="0" smtClean="0"/>
-              <a:t> leave the room with the knowledge we propose here.</a:t>
-            </a:r>
-            <a:endParaRPr lang="en-GB" dirty="0"/>
+              <a:rPr lang="en-US" dirty="0" smtClean="0"/>
+              <a:t>My name is Arturo </a:t>
+            </a:r>
+            <a:r>
+              <a:rPr lang="en-US" dirty="0" err="1" smtClean="0"/>
+              <a:t>Núñez</a:t>
+            </a:r>
+            <a:r>
+              <a:rPr lang="en-US" dirty="0" smtClean="0"/>
+              <a:t>, I work as a product evangelist for the Latin American region and before joining Unity I was working at game studios mostly in</a:t>
+            </a:r>
+            <a:r>
+              <a:rPr lang="en-US" baseline="0" dirty="0" smtClean="0"/>
+              <a:t> 2D games. So I know the struggles of having to use a 3D engine to make 2D games.</a:t>
+            </a:r>
           </a:p>
         </p:txBody>
       </p:sp>
@@ -823,7 +1246,7 @@
             <a:fld id="{49436F85-577F-4A92-A47F-D540A2BCC821}" type="slidenum">
               <a:rPr lang="en-GB" smtClean="0"/>
               <a:pPr/>
-              <a:t>5</a:t>
+              <a:t>4</a:t>
             </a:fld>
             <a:endParaRPr lang="en-GB" dirty="0"/>
           </a:p>
@@ -832,7 +1255,7 @@
     </p:spTree>
     <p:extLst>
       <p:ext uri="{BB962C8B-B14F-4D97-AF65-F5344CB8AC3E}">
-        <p14:creationId xmlns:p14="http://schemas.microsoft.com/office/powerpoint/2010/main" val="1936601504"/>
+        <p14:creationId xmlns:p14="http://schemas.microsoft.com/office/powerpoint/2010/main" val="240433027"/>
       </p:ext>
     </p:extLst>
   </p:cSld>
@@ -886,6 +1309,23 @@
           <a:bodyPr/>
           <a:lstStyle/>
           <a:p>
+            <a:r>
+              <a:rPr lang="en-GB" dirty="0" smtClean="0"/>
+              <a:t>Here, we will mention the main objectives of attending the talk. </a:t>
+            </a:r>
+          </a:p>
+          <a:p>
+            <a:endParaRPr lang="en-GB" dirty="0" smtClean="0"/>
+          </a:p>
+          <a:p>
+            <a:r>
+              <a:rPr lang="en-GB" dirty="0" smtClean="0"/>
+              <a:t>Note for translators: Maybe this is the key slide, since we need to make sure that attendees can</a:t>
+            </a:r>
+            <a:r>
+              <a:rPr lang="en-GB" baseline="0" dirty="0" smtClean="0"/>
+              <a:t> leave the room with the knowledge we propose here.</a:t>
+            </a:r>
             <a:endParaRPr lang="en-GB" dirty="0"/>
           </a:p>
         </p:txBody>
@@ -908,7 +1348,7 @@
             <a:fld id="{49436F85-577F-4A92-A47F-D540A2BCC821}" type="slidenum">
               <a:rPr lang="en-GB" smtClean="0"/>
               <a:pPr/>
-              <a:t>6</a:t>
+              <a:t>5</a:t>
             </a:fld>
             <a:endParaRPr lang="en-GB" dirty="0"/>
           </a:p>
@@ -917,7 +1357,7 @@
     </p:spTree>
     <p:extLst>
       <p:ext uri="{BB962C8B-B14F-4D97-AF65-F5344CB8AC3E}">
-        <p14:creationId xmlns:p14="http://schemas.microsoft.com/office/powerpoint/2010/main" val="3946937812"/>
+        <p14:creationId xmlns:p14="http://schemas.microsoft.com/office/powerpoint/2010/main" val="1936601504"/>
       </p:ext>
     </p:extLst>
   </p:cSld>
@@ -971,40 +1411,7 @@
           <a:bodyPr/>
           <a:lstStyle/>
           <a:p>
-            <a:r>
-              <a:rPr lang="en-GB" dirty="0" smtClean="0"/>
-              <a:t>This slide is to define what the purpose of animation in games is.</a:t>
-            </a:r>
-            <a:r>
-              <a:rPr lang="en-GB" baseline="0" dirty="0" smtClean="0"/>
-              <a:t> Which is simulate that the characters and other elements in the game are alive.</a:t>
-            </a:r>
-          </a:p>
-          <a:p>
-            <a:endParaRPr lang="en-GB" baseline="0" dirty="0" smtClean="0"/>
-          </a:p>
-          <a:p>
-            <a:r>
-              <a:rPr lang="en-GB" baseline="0" dirty="0" smtClean="0"/>
-              <a:t>The animation is known also as the illusion of life, which basically transforms unanimated drawings or models into living characters. No matter which animation technique we end up using, the goal is to always have a consistent animation that makes the player he is inside the video game.</a:t>
-            </a:r>
-          </a:p>
-          <a:p>
-            <a:endParaRPr lang="en-GB" baseline="0" dirty="0" smtClean="0"/>
-          </a:p>
-          <a:p>
-            <a:r>
-              <a:rPr lang="en-GB" baseline="0" dirty="0" smtClean="0"/>
-              <a:t>If for any reason, the animation fails (breaks, is not good enough, drops frames, </a:t>
-            </a:r>
-            <a:r>
-              <a:rPr lang="en-GB" baseline="0" dirty="0" err="1" smtClean="0"/>
-              <a:t>etc</a:t>
-            </a:r>
-            <a:r>
-              <a:rPr lang="en-GB" baseline="0" dirty="0" smtClean="0"/>
-              <a:t>) the player will feel disconnected from the game and will start thinking about it as a piece of software. We want to avoid that.</a:t>
-            </a:r>
+            <a:endParaRPr lang="en-GB" dirty="0"/>
           </a:p>
         </p:txBody>
       </p:sp>
@@ -1026,7 +1433,7 @@
             <a:fld id="{49436F85-577F-4A92-A47F-D540A2BCC821}" type="slidenum">
               <a:rPr lang="en-GB" smtClean="0"/>
               <a:pPr/>
-              <a:t>7</a:t>
+              <a:t>6</a:t>
             </a:fld>
             <a:endParaRPr lang="en-GB" dirty="0"/>
           </a:p>
@@ -1035,7 +1442,7 @@
     </p:spTree>
     <p:extLst>
       <p:ext uri="{BB962C8B-B14F-4D97-AF65-F5344CB8AC3E}">
-        <p14:creationId xmlns:p14="http://schemas.microsoft.com/office/powerpoint/2010/main" val="1135882957"/>
+        <p14:creationId xmlns:p14="http://schemas.microsoft.com/office/powerpoint/2010/main" val="3946937812"/>
       </p:ext>
     </p:extLst>
   </p:cSld>
@@ -1091,31 +1498,38 @@
           <a:p>
             <a:r>
               <a:rPr lang="en-GB" dirty="0" smtClean="0"/>
-              <a:t>In this part, I will show a demo using Unity (the software)</a:t>
+              <a:t>This slide is to define what the purpose of animation in games is.</a:t>
             </a:r>
             <a:r>
               <a:rPr lang="en-GB" baseline="0" dirty="0" smtClean="0"/>
-              <a:t> to Rig, Animate and Move a character using the Anima2D Animation Tool. </a:t>
-            </a:r>
+              <a:t> Which is simulate that the characters and other elements in the game are alive.</a:t>
+            </a:r>
+          </a:p>
+          <a:p>
+            <a:endParaRPr lang="en-GB" baseline="0" dirty="0" smtClean="0"/>
           </a:p>
           <a:p>
             <a:r>
               <a:rPr lang="en-GB" baseline="0" dirty="0" smtClean="0"/>
-              <a:t>I’m still working on the Assets but, key important things to know are: Bones, Vertices, Attachments, Timeline, </a:t>
+              <a:t>The animation is known also as the illusion of life, which basically transforms unanimated drawings or models into living characters. No matter which animation technique we end up using, the goal is to always have a consistent animation that makes the player he is inside the video game.</a:t>
+            </a:r>
+          </a:p>
+          <a:p>
+            <a:endParaRPr lang="en-GB" baseline="0" dirty="0" smtClean="0"/>
+          </a:p>
+          <a:p>
+            <a:r>
+              <a:rPr lang="en-GB" baseline="0" dirty="0" smtClean="0"/>
+              <a:t>If for any reason, the animation fails (breaks, is not good enough, drops frames, </a:t>
             </a:r>
             <a:r>
               <a:rPr lang="en-GB" baseline="0" dirty="0" err="1" smtClean="0"/>
-              <a:t>Dopesheet</a:t>
+              <a:t>etc</a:t>
             </a:r>
             <a:r>
               <a:rPr lang="en-GB" baseline="0" dirty="0" smtClean="0"/>
-              <a:t>, </a:t>
-            </a:r>
-            <a:r>
-              <a:rPr lang="en-GB" baseline="0" dirty="0" smtClean="0"/>
-              <a:t>IK, animation curve and interpolation.</a:t>
-            </a:r>
-            <a:endParaRPr lang="en-GB" dirty="0"/>
+              <a:t>) the player will feel disconnected from the game and will start thinking about it as a piece of software. We want to avoid that.</a:t>
+            </a:r>
           </a:p>
         </p:txBody>
       </p:sp>
@@ -1137,7 +1551,7 @@
             <a:fld id="{49436F85-577F-4A92-A47F-D540A2BCC821}" type="slidenum">
               <a:rPr lang="en-GB" smtClean="0"/>
               <a:pPr/>
-              <a:t>10</a:t>
+              <a:t>7</a:t>
             </a:fld>
             <a:endParaRPr lang="en-GB" dirty="0"/>
           </a:p>
@@ -1146,7 +1560,7 @@
     </p:spTree>
     <p:extLst>
       <p:ext uri="{BB962C8B-B14F-4D97-AF65-F5344CB8AC3E}">
-        <p14:creationId xmlns:p14="http://schemas.microsoft.com/office/powerpoint/2010/main" val="2342777617"/>
+        <p14:creationId xmlns:p14="http://schemas.microsoft.com/office/powerpoint/2010/main" val="1135882957"/>
       </p:ext>
     </p:extLst>
   </p:cSld>
@@ -1201,18 +1615,23 @@
           <a:lstStyle/>
           <a:p>
             <a:r>
-              <a:rPr lang="en-GB" dirty="0" smtClean="0"/>
-              <a:t>Here, I will show videos that</a:t>
-            </a:r>
-            <a:r>
-              <a:rPr lang="en-GB" baseline="0" dirty="0" smtClean="0"/>
-              <a:t> demonstrates the progress </a:t>
-            </a:r>
-            <a:r>
-              <a:rPr lang="en-GB" baseline="0" dirty="0" smtClean="0"/>
-              <a:t>of the native Animation tool for 2D in Unity. I’m waiting for the material but the examples here will be similar to what I showed in the demo, the difference is that they will now be integrated in the software and not via an external plugin as it is now.</a:t>
-            </a:r>
-            <a:endParaRPr lang="en-GB" dirty="0"/>
+              <a:rPr lang="en-US" dirty="0" smtClean="0"/>
+              <a:t>We will start covering the technique</a:t>
+            </a:r>
+            <a:r>
+              <a:rPr lang="en-US" baseline="0" dirty="0" smtClean="0"/>
+              <a:t> called “Frame by Frame” animation, which has been around in the films and cartoons industry for quite some time. In this technique, we are basically flipping through the pages of a notebook. Where each page contains a part or frame of the animation with a small change with respect to the previous one.</a:t>
+            </a:r>
+          </a:p>
+          <a:p>
+            <a:endParaRPr lang="en-US" baseline="0" dirty="0" smtClean="0"/>
+          </a:p>
+          <a:p>
+            <a:r>
+              <a:rPr lang="en-US" baseline="0" dirty="0" smtClean="0"/>
+              <a:t>In games, what we usually have, is a large texture called a Sprite Sheet, and what we do is to draw a frame of the texture during a period of time, then after x time passes, we switch to the other one and this gives the illusion of movement.</a:t>
+            </a:r>
+            <a:endParaRPr lang="en-US" dirty="0"/>
           </a:p>
         </p:txBody>
       </p:sp>
@@ -1234,7 +1653,7 @@
             <a:fld id="{49436F85-577F-4A92-A47F-D540A2BCC821}" type="slidenum">
               <a:rPr lang="en-GB" smtClean="0"/>
               <a:pPr/>
-              <a:t>11</a:t>
+              <a:t>8</a:t>
             </a:fld>
             <a:endParaRPr lang="en-GB" dirty="0"/>
           </a:p>
@@ -1243,7 +1662,7 @@
     </p:spTree>
     <p:extLst>
       <p:ext uri="{BB962C8B-B14F-4D97-AF65-F5344CB8AC3E}">
-        <p14:creationId xmlns:p14="http://schemas.microsoft.com/office/powerpoint/2010/main" val="8296490"/>
+        <p14:creationId xmlns:p14="http://schemas.microsoft.com/office/powerpoint/2010/main" val="512073571"/>
       </p:ext>
     </p:extLst>
   </p:cSld>
@@ -1297,7 +1716,41 @@
           <a:bodyPr/>
           <a:lstStyle/>
           <a:p>
-            <a:endParaRPr lang="en-GB"/>
+            <a:r>
+              <a:rPr lang="en-US" dirty="0" smtClean="0"/>
+              <a:t>This is the other technique, called the skeletal</a:t>
+            </a:r>
+            <a:r>
+              <a:rPr lang="en-US" baseline="0" dirty="0" smtClean="0"/>
+              <a:t> based animation. It is called like this because we will create a skeleton for our characters, and the skeleton will be animated (with </a:t>
+            </a:r>
+            <a:r>
+              <a:rPr lang="en-US" baseline="0" dirty="0" err="1" smtClean="0"/>
+              <a:t>keyframes</a:t>
+            </a:r>
+            <a:r>
+              <a:rPr lang="en-US" baseline="0" dirty="0" smtClean="0"/>
+              <a:t>), thus, the images that are attached to those bones, will move when the bone moves accordingly.</a:t>
+            </a:r>
+          </a:p>
+          <a:p>
+            <a:endParaRPr lang="en-US" baseline="0" dirty="0" smtClean="0"/>
+          </a:p>
+          <a:p>
+            <a:r>
+              <a:rPr lang="en-US" baseline="0" dirty="0" smtClean="0"/>
+              <a:t>As a quick note, this technique allows us to have a high number of animations without increasing the build size, which is important. However, the animation takes place on the CPU we need to consider this.</a:t>
+            </a:r>
+          </a:p>
+          <a:p>
+            <a:endParaRPr lang="en-US" baseline="0" dirty="0" smtClean="0"/>
+          </a:p>
+          <a:p>
+            <a:r>
+              <a:rPr lang="en-US" baseline="0" dirty="0" smtClean="0"/>
+              <a:t>We will discuss more about this in a couple of minutes.</a:t>
+            </a:r>
+            <a:endParaRPr lang="en-US" dirty="0"/>
           </a:p>
         </p:txBody>
       </p:sp>
@@ -1319,7 +1772,7 @@
             <a:fld id="{49436F85-577F-4A92-A47F-D540A2BCC821}" type="slidenum">
               <a:rPr lang="en-GB" smtClean="0"/>
               <a:pPr/>
-              <a:t>12</a:t>
+              <a:t>9</a:t>
             </a:fld>
             <a:endParaRPr lang="en-GB" dirty="0"/>
           </a:p>
@@ -1328,7 +1781,7 @@
     </p:spTree>
     <p:extLst>
       <p:ext uri="{BB962C8B-B14F-4D97-AF65-F5344CB8AC3E}">
-        <p14:creationId xmlns:p14="http://schemas.microsoft.com/office/powerpoint/2010/main" val="3231049928"/>
+        <p14:creationId xmlns:p14="http://schemas.microsoft.com/office/powerpoint/2010/main" val="1820651781"/>
       </p:ext>
     </p:extLst>
   </p:cSld>
@@ -1382,21 +1835,27 @@
           <a:bodyPr/>
           <a:lstStyle/>
           <a:p>
+            <a:endParaRPr lang="en-US" dirty="0" smtClean="0"/>
+          </a:p>
+          <a:p>
+            <a:endParaRPr lang="en-US" dirty="0" smtClean="0"/>
+          </a:p>
+          <a:p>
             <a:r>
               <a:rPr lang="en-US" dirty="0" smtClean="0"/>
-              <a:t>Q&amp;A</a:t>
-            </a:r>
-            <a:endParaRPr lang="en-US" baseline="0" dirty="0" smtClean="0"/>
-          </a:p>
-          <a:p>
-            <a:endParaRPr lang="en-US" baseline="0" dirty="0" smtClean="0"/>
-          </a:p>
-          <a:p>
+              <a:t>Notes for the translators:</a:t>
+            </a:r>
+          </a:p>
+          <a:p>
+            <a:r>
+              <a:rPr lang="en-US" dirty="0" smtClean="0"/>
+              <a:t>In this slide, we will discuss how one technique over the other affects the build size(the size in MB of the game).</a:t>
+            </a:r>
             <a:r>
               <a:rPr lang="en-US" baseline="0" dirty="0" smtClean="0"/>
-              <a:t>Note for Translator: How do I say Q&amp;A in Japanese?</a:t>
-            </a:r>
-            <a:endParaRPr lang="en-GB" dirty="0"/>
+              <a:t> Basically, if we </a:t>
+            </a:r>
+            <a:endParaRPr lang="en-US" dirty="0"/>
           </a:p>
         </p:txBody>
       </p:sp>
@@ -1418,7 +1877,7 @@
             <a:fld id="{49436F85-577F-4A92-A47F-D540A2BCC821}" type="slidenum">
               <a:rPr lang="en-GB" smtClean="0"/>
               <a:pPr/>
-              <a:t>13</a:t>
+              <a:t>11</a:t>
             </a:fld>
             <a:endParaRPr lang="en-GB" dirty="0"/>
           </a:p>
@@ -1427,7 +1886,7 @@
     </p:spTree>
     <p:extLst>
       <p:ext uri="{BB962C8B-B14F-4D97-AF65-F5344CB8AC3E}">
-        <p14:creationId xmlns:p14="http://schemas.microsoft.com/office/powerpoint/2010/main" val="947654780"/>
+        <p14:creationId xmlns:p14="http://schemas.microsoft.com/office/powerpoint/2010/main" val="3161639750"/>
       </p:ext>
     </p:extLst>
   </p:cSld>
@@ -3216,7 +3675,7 @@
             <a:fld id="{54E0A626-36E7-4ACB-AE94-30B8AB1B2246}" type="datetimeFigureOut">
               <a:rPr lang="en-GB" smtClean="0"/>
               <a:pPr/>
-              <a:t>25/04/2017</a:t>
+              <a:t>27/04/2017</a:t>
             </a:fld>
             <a:endParaRPr lang="en-GB" dirty="0"/>
           </a:p>
@@ -3760,6 +4219,349 @@
       </p:grpSpPr>
       <p:sp>
         <p:nvSpPr>
+          <p:cNvPr id="2" name="Title 1"/>
+          <p:cNvSpPr>
+            <a:spLocks noGrp="1"/>
+          </p:cNvSpPr>
+          <p:nvPr>
+            <p:ph type="title"/>
+          </p:nvPr>
+        </p:nvSpPr>
+        <p:spPr/>
+        <p:txBody>
+          <a:bodyPr/>
+          <a:lstStyle/>
+          <a:p>
+            <a:r>
+              <a:rPr lang="en-US" dirty="0" smtClean="0">
+                <a:latin typeface="+mj-lt"/>
+              </a:rPr>
+              <a:t>Artistic Comparison</a:t>
+            </a:r>
+            <a:endParaRPr lang="en-US" dirty="0">
+              <a:latin typeface="+mj-lt"/>
+            </a:endParaRPr>
+          </a:p>
+        </p:txBody>
+      </p:sp>
+      <p:sp>
+        <p:nvSpPr>
+          <p:cNvPr id="3" name="Text Placeholder 2"/>
+          <p:cNvSpPr>
+            <a:spLocks noGrp="1"/>
+          </p:cNvSpPr>
+          <p:nvPr>
+            <p:ph type="body" sz="quarter" idx="10"/>
+          </p:nvPr>
+        </p:nvSpPr>
+        <p:spPr/>
+        <p:txBody>
+          <a:bodyPr/>
+          <a:lstStyle/>
+          <a:p>
+            <a:endParaRPr lang="en-US"/>
+          </a:p>
+        </p:txBody>
+      </p:sp>
+    </p:spTree>
+    <p:extLst>
+      <p:ext uri="{BB962C8B-B14F-4D97-AF65-F5344CB8AC3E}">
+        <p14:creationId xmlns:p14="http://schemas.microsoft.com/office/powerpoint/2010/main" val="1729109577"/>
+      </p:ext>
+    </p:extLst>
+  </p:cSld>
+  <p:clrMapOvr>
+    <a:masterClrMapping/>
+  </p:clrMapOvr>
+  <mc:AlternateContent xmlns:mc="http://schemas.openxmlformats.org/markup-compatibility/2006" xmlns:p14="http://schemas.microsoft.com/office/powerpoint/2010/main">
+    <mc:Choice Requires="p14">
+      <p:transition spd="slow" p14:dur="2000"/>
+    </mc:Choice>
+    <mc:Fallback xmlns="">
+      <p:transition spd="slow"/>
+    </mc:Fallback>
+  </mc:AlternateContent>
+  <p:timing>
+    <p:tnLst>
+      <p:par>
+        <p:cTn id="1" dur="indefinite" restart="never" nodeType="tmRoot"/>
+      </p:par>
+    </p:tnLst>
+  </p:timing>
+</p:sld>
+</file>
+
+<file path=ppt/slides/slide11.xml><?xml version="1.0" encoding="utf-8"?>
+<p:sld xmlns:a="http://schemas.openxmlformats.org/drawingml/2006/main" xmlns:r="http://schemas.openxmlformats.org/officeDocument/2006/relationships" xmlns:p="http://schemas.openxmlformats.org/presentationml/2006/main">
+  <p:cSld>
+    <p:spTree>
+      <p:nvGrpSpPr>
+        <p:cNvPr id="1" name=""/>
+        <p:cNvGrpSpPr/>
+        <p:nvPr/>
+      </p:nvGrpSpPr>
+      <p:grpSpPr>
+        <a:xfrm>
+          <a:off x="0" y="0"/>
+          <a:ext cx="0" cy="0"/>
+          <a:chOff x="0" y="0"/>
+          <a:chExt cx="0" cy="0"/>
+        </a:xfrm>
+      </p:grpSpPr>
+      <p:sp>
+        <p:nvSpPr>
+          <p:cNvPr id="2" name="Title 1"/>
+          <p:cNvSpPr>
+            <a:spLocks noGrp="1"/>
+          </p:cNvSpPr>
+          <p:nvPr>
+            <p:ph type="title"/>
+          </p:nvPr>
+        </p:nvSpPr>
+        <p:spPr/>
+        <p:txBody>
+          <a:bodyPr/>
+          <a:lstStyle/>
+          <a:p>
+            <a:r>
+              <a:rPr lang="en-US" dirty="0" smtClean="0">
+                <a:latin typeface="+mj-lt"/>
+              </a:rPr>
+              <a:t>Build Size</a:t>
+            </a:r>
+            <a:endParaRPr lang="en-US" dirty="0">
+              <a:latin typeface="+mj-lt"/>
+            </a:endParaRPr>
+          </a:p>
+        </p:txBody>
+      </p:sp>
+      <p:sp>
+        <p:nvSpPr>
+          <p:cNvPr id="3" name="Text Placeholder 2"/>
+          <p:cNvSpPr>
+            <a:spLocks noGrp="1"/>
+          </p:cNvSpPr>
+          <p:nvPr>
+            <p:ph type="body" sz="quarter" idx="10"/>
+          </p:nvPr>
+        </p:nvSpPr>
+        <p:spPr/>
+        <p:txBody>
+          <a:bodyPr/>
+          <a:lstStyle/>
+          <a:p>
+            <a:endParaRPr lang="en-US"/>
+          </a:p>
+        </p:txBody>
+      </p:sp>
+    </p:spTree>
+    <p:extLst>
+      <p:ext uri="{BB962C8B-B14F-4D97-AF65-F5344CB8AC3E}">
+        <p14:creationId xmlns:p14="http://schemas.microsoft.com/office/powerpoint/2010/main" val="221284441"/>
+      </p:ext>
+    </p:extLst>
+  </p:cSld>
+  <p:clrMapOvr>
+    <a:masterClrMapping/>
+  </p:clrMapOvr>
+  <mc:AlternateContent xmlns:mc="http://schemas.openxmlformats.org/markup-compatibility/2006" xmlns:p14="http://schemas.microsoft.com/office/powerpoint/2010/main">
+    <mc:Choice Requires="p14">
+      <p:transition spd="slow" p14:dur="2000"/>
+    </mc:Choice>
+    <mc:Fallback xmlns="">
+      <p:transition spd="slow"/>
+    </mc:Fallback>
+  </mc:AlternateContent>
+</p:sld>
+</file>
+
+<file path=ppt/slides/slide12.xml><?xml version="1.0" encoding="utf-8"?>
+<p:sld xmlns:a="http://schemas.openxmlformats.org/drawingml/2006/main" xmlns:r="http://schemas.openxmlformats.org/officeDocument/2006/relationships" xmlns:p="http://schemas.openxmlformats.org/presentationml/2006/main">
+  <p:cSld>
+    <p:spTree>
+      <p:nvGrpSpPr>
+        <p:cNvPr id="1" name=""/>
+        <p:cNvGrpSpPr/>
+        <p:nvPr/>
+      </p:nvGrpSpPr>
+      <p:grpSpPr>
+        <a:xfrm>
+          <a:off x="0" y="0"/>
+          <a:ext cx="0" cy="0"/>
+          <a:chOff x="0" y="0"/>
+          <a:chExt cx="0" cy="0"/>
+        </a:xfrm>
+      </p:grpSpPr>
+      <p:sp>
+        <p:nvSpPr>
+          <p:cNvPr id="2" name="Title 1"/>
+          <p:cNvSpPr>
+            <a:spLocks noGrp="1"/>
+          </p:cNvSpPr>
+          <p:nvPr>
+            <p:ph type="title"/>
+          </p:nvPr>
+        </p:nvSpPr>
+        <p:spPr/>
+        <p:txBody>
+          <a:bodyPr/>
+          <a:lstStyle/>
+          <a:p>
+            <a:r>
+              <a:rPr lang="en-US" dirty="0" smtClean="0">
+                <a:latin typeface="+mj-lt"/>
+              </a:rPr>
+              <a:t>CPU Overhead</a:t>
+            </a:r>
+            <a:endParaRPr lang="en-US" dirty="0">
+              <a:latin typeface="+mj-lt"/>
+            </a:endParaRPr>
+          </a:p>
+        </p:txBody>
+      </p:sp>
+      <p:sp>
+        <p:nvSpPr>
+          <p:cNvPr id="3" name="Text Placeholder 2"/>
+          <p:cNvSpPr>
+            <a:spLocks noGrp="1"/>
+          </p:cNvSpPr>
+          <p:nvPr>
+            <p:ph type="body" sz="quarter" idx="10"/>
+          </p:nvPr>
+        </p:nvSpPr>
+        <p:spPr/>
+        <p:txBody>
+          <a:bodyPr/>
+          <a:lstStyle/>
+          <a:p>
+            <a:endParaRPr lang="en-US"/>
+          </a:p>
+        </p:txBody>
+      </p:sp>
+    </p:spTree>
+    <p:extLst>
+      <p:ext uri="{BB962C8B-B14F-4D97-AF65-F5344CB8AC3E}">
+        <p14:creationId xmlns:p14="http://schemas.microsoft.com/office/powerpoint/2010/main" val="427971196"/>
+      </p:ext>
+    </p:extLst>
+  </p:cSld>
+  <p:clrMapOvr>
+    <a:masterClrMapping/>
+  </p:clrMapOvr>
+  <mc:AlternateContent xmlns:mc="http://schemas.openxmlformats.org/markup-compatibility/2006" xmlns:p14="http://schemas.microsoft.com/office/powerpoint/2010/main">
+    <mc:Choice Requires="p14">
+      <p:transition spd="slow" p14:dur="2000"/>
+    </mc:Choice>
+    <mc:Fallback xmlns="">
+      <p:transition spd="slow"/>
+    </mc:Fallback>
+  </mc:AlternateContent>
+</p:sld>
+</file>
+
+<file path=ppt/slides/slide13.xml><?xml version="1.0" encoding="utf-8"?>
+<p:sld xmlns:a="http://schemas.openxmlformats.org/drawingml/2006/main" xmlns:r="http://schemas.openxmlformats.org/officeDocument/2006/relationships" xmlns:p="http://schemas.openxmlformats.org/presentationml/2006/main">
+  <p:cSld>
+    <p:spTree>
+      <p:nvGrpSpPr>
+        <p:cNvPr id="1" name=""/>
+        <p:cNvGrpSpPr/>
+        <p:nvPr/>
+      </p:nvGrpSpPr>
+      <p:grpSpPr>
+        <a:xfrm>
+          <a:off x="0" y="0"/>
+          <a:ext cx="0" cy="0"/>
+          <a:chOff x="0" y="0"/>
+          <a:chExt cx="0" cy="0"/>
+        </a:xfrm>
+      </p:grpSpPr>
+      <p:sp>
+        <p:nvSpPr>
+          <p:cNvPr id="2" name="Title 1"/>
+          <p:cNvSpPr>
+            <a:spLocks noGrp="1"/>
+          </p:cNvSpPr>
+          <p:nvPr>
+            <p:ph type="title"/>
+          </p:nvPr>
+        </p:nvSpPr>
+        <p:spPr/>
+        <p:txBody>
+          <a:bodyPr/>
+          <a:lstStyle/>
+          <a:p>
+            <a:r>
+              <a:rPr lang="en-US" dirty="0" smtClean="0">
+                <a:latin typeface="+mj-lt"/>
+              </a:rPr>
+              <a:t>Gameplay</a:t>
+            </a:r>
+            <a:endParaRPr lang="en-US" dirty="0">
+              <a:latin typeface="+mj-lt"/>
+            </a:endParaRPr>
+          </a:p>
+        </p:txBody>
+      </p:sp>
+      <p:sp>
+        <p:nvSpPr>
+          <p:cNvPr id="3" name="Text Placeholder 2"/>
+          <p:cNvSpPr>
+            <a:spLocks noGrp="1"/>
+          </p:cNvSpPr>
+          <p:nvPr>
+            <p:ph type="body" sz="quarter" idx="10"/>
+          </p:nvPr>
+        </p:nvSpPr>
+        <p:spPr/>
+        <p:txBody>
+          <a:bodyPr/>
+          <a:lstStyle/>
+          <a:p>
+            <a:endParaRPr lang="en-US"/>
+          </a:p>
+        </p:txBody>
+      </p:sp>
+    </p:spTree>
+    <p:extLst>
+      <p:ext uri="{BB962C8B-B14F-4D97-AF65-F5344CB8AC3E}">
+        <p14:creationId xmlns:p14="http://schemas.microsoft.com/office/powerpoint/2010/main" val="1616931193"/>
+      </p:ext>
+    </p:extLst>
+  </p:cSld>
+  <p:clrMapOvr>
+    <a:masterClrMapping/>
+  </p:clrMapOvr>
+  <mc:AlternateContent xmlns:mc="http://schemas.openxmlformats.org/markup-compatibility/2006" xmlns:p14="http://schemas.microsoft.com/office/powerpoint/2010/main">
+    <mc:Choice Requires="p14">
+      <p:transition spd="slow" p14:dur="2000"/>
+    </mc:Choice>
+    <mc:Fallback xmlns="">
+      <p:transition spd="slow"/>
+    </mc:Fallback>
+  </mc:AlternateContent>
+</p:sld>
+</file>
+
+<file path=ppt/slides/slide14.xml><?xml version="1.0" encoding="utf-8"?>
+<p:sld xmlns:a="http://schemas.openxmlformats.org/drawingml/2006/main" xmlns:r="http://schemas.openxmlformats.org/officeDocument/2006/relationships" xmlns:p="http://schemas.openxmlformats.org/presentationml/2006/main">
+  <p:cSld>
+    <p:spTree>
+      <p:nvGrpSpPr>
+        <p:cNvPr id="1" name=""/>
+        <p:cNvGrpSpPr/>
+        <p:nvPr/>
+      </p:nvGrpSpPr>
+      <p:grpSpPr>
+        <a:xfrm>
+          <a:off x="0" y="0"/>
+          <a:ext cx="0" cy="0"/>
+          <a:chOff x="0" y="0"/>
+          <a:chExt cx="0" cy="0"/>
+        </a:xfrm>
+      </p:grpSpPr>
+      <p:sp>
+        <p:nvSpPr>
           <p:cNvPr id="5" name="Title 4"/>
           <p:cNvSpPr>
             <a:spLocks noGrp="1"/>
@@ -3843,7 +4645,7 @@
 </p:sld>
 </file>
 
-<file path=ppt/slides/slide11.xml><?xml version="1.0" encoding="utf-8"?>
+<file path=ppt/slides/slide15.xml><?xml version="1.0" encoding="utf-8"?>
 <p:sld xmlns:a="http://schemas.openxmlformats.org/drawingml/2006/main" xmlns:r="http://schemas.openxmlformats.org/officeDocument/2006/relationships" xmlns:p="http://schemas.openxmlformats.org/presentationml/2006/main">
   <p:cSld>
     <p:spTree>
@@ -3934,7 +4736,7 @@
 </p:sld>
 </file>
 
-<file path=ppt/slides/slide12.xml><?xml version="1.0" encoding="utf-8"?>
+<file path=ppt/slides/slide16.xml><?xml version="1.0" encoding="utf-8"?>
 <p:sld xmlns:a="http://schemas.openxmlformats.org/drawingml/2006/main" xmlns:r="http://schemas.openxmlformats.org/officeDocument/2006/relationships" xmlns:p="http://schemas.openxmlformats.org/presentationml/2006/main">
   <p:cSld>
     <p:spTree>
@@ -4086,7 +4888,7 @@
 </p:sld>
 </file>
 
-<file path=ppt/slides/slide13.xml><?xml version="1.0" encoding="utf-8"?>
+<file path=ppt/slides/slide17.xml><?xml version="1.0" encoding="utf-8"?>
 <p:sld xmlns:a="http://schemas.openxmlformats.org/drawingml/2006/main" xmlns:r="http://schemas.openxmlformats.org/officeDocument/2006/relationships" xmlns:p="http://schemas.openxmlformats.org/presentationml/2006/main">
   <p:cSld>
     <p:spTree>
@@ -4158,7 +4960,7 @@
 </p:sld>
 </file>
 
-<file path=ppt/slides/slide14.xml><?xml version="1.0" encoding="utf-8"?>
+<file path=ppt/slides/slide18.xml><?xml version="1.0" encoding="utf-8"?>
 <p:sld xmlns:a="http://schemas.openxmlformats.org/drawingml/2006/main" xmlns:r="http://schemas.openxmlformats.org/officeDocument/2006/relationships" xmlns:p="http://schemas.openxmlformats.org/presentationml/2006/main">
   <p:cSld>
     <p:spTree>
@@ -4379,13 +5181,7 @@
               <a:rPr lang="da-DK" sz="2800" b="0" dirty="0" smtClean="0">
                 <a:latin typeface="+mj-lt"/>
               </a:rPr>
-              <a:t>Product Evangelist, Unity </a:t>
-            </a:r>
-            <a:r>
-              <a:rPr lang="da-DK" sz="2800" b="0" dirty="0" smtClean="0">
-                <a:latin typeface="+mj-lt"/>
-              </a:rPr>
-              <a:t>Technologies</a:t>
+              <a:t>Product Evangelist, Unity Technologies</a:t>
             </a:r>
             <a:r>
               <a:rPr lang="da-DK" sz="3200" b="0" dirty="0" smtClean="0">
@@ -4816,9 +5612,6 @@
               </a:rPr>
               <a:t>The Illusion of Life</a:t>
             </a:r>
-            <a:endParaRPr lang="en-GB" sz="5400" dirty="0" smtClean="0">
-              <a:latin typeface="+mj-lt"/>
-            </a:endParaRPr>
           </a:p>
         </p:txBody>
       </p:sp>
@@ -4924,25 +5717,36 @@
           </a:p>
         </p:txBody>
       </p:sp>
-      <p:sp>
-        <p:nvSpPr>
-          <p:cNvPr id="3" name="Text Placeholder 2"/>
-          <p:cNvSpPr>
-            <a:spLocks noGrp="1"/>
-          </p:cNvSpPr>
-          <p:nvPr>
-            <p:ph type="body" sz="quarter" idx="10"/>
-          </p:nvPr>
-        </p:nvSpPr>
-        <p:spPr/>
-        <p:txBody>
-          <a:bodyPr/>
-          <a:lstStyle/>
-          <a:p>
-            <a:endParaRPr lang="en-US"/>
-          </a:p>
-        </p:txBody>
-      </p:sp>
+      <p:pic>
+        <p:nvPicPr>
+          <p:cNvPr id="4" name="Picture 3"/>
+          <p:cNvPicPr>
+            <a:picLocks noChangeAspect="1"/>
+          </p:cNvPicPr>
+          <p:nvPr/>
+        </p:nvPicPr>
+        <p:blipFill>
+          <a:blip r:embed="rId3">
+            <a:extLst>
+              <a:ext uri="{28A0092B-C50C-407E-A947-70E740481C1C}">
+                <a14:useLocalDpi xmlns:a14="http://schemas.microsoft.com/office/drawing/2010/main" val="0"/>
+              </a:ext>
+            </a:extLst>
+          </a:blip>
+          <a:stretch>
+            <a:fillRect/>
+          </a:stretch>
+        </p:blipFill>
+        <p:spPr>
+          <a:xfrm>
+            <a:off x="539999" y="1398805"/>
+            <a:ext cx="5142836" cy="2876701"/>
+          </a:xfrm>
+          <a:prstGeom prst="rect">
+            <a:avLst/>
+          </a:prstGeom>
+        </p:spPr>
+      </p:pic>
     </p:spTree>
     <p:extLst>
       <p:ext uri="{BB962C8B-B14F-4D97-AF65-F5344CB8AC3E}">
@@ -4961,6 +5765,13 @@
       <p:transition spd="slow"/>
     </mc:Fallback>
   </mc:AlternateContent>
+  <p:timing>
+    <p:tnLst>
+      <p:par>
+        <p:cTn id="1" dur="indefinite" restart="never" nodeType="tmRoot"/>
+      </p:par>
+    </p:tnLst>
+  </p:timing>
 </p:sld>
 </file>
 
@@ -5008,25 +5819,66 @@
           </a:p>
         </p:txBody>
       </p:sp>
-      <p:sp>
-        <p:nvSpPr>
-          <p:cNvPr id="3" name="Text Placeholder 2"/>
-          <p:cNvSpPr>
-            <a:spLocks noGrp="1"/>
-          </p:cNvSpPr>
-          <p:nvPr>
-            <p:ph type="body" sz="quarter" idx="10"/>
-          </p:nvPr>
-        </p:nvSpPr>
-        <p:spPr/>
-        <p:txBody>
-          <a:bodyPr/>
-          <a:lstStyle/>
-          <a:p>
-            <a:endParaRPr lang="en-US"/>
-          </a:p>
-        </p:txBody>
-      </p:sp>
+      <p:pic>
+        <p:nvPicPr>
+          <p:cNvPr id="4" name="Picture 3"/>
+          <p:cNvPicPr>
+            <a:picLocks noChangeAspect="1"/>
+          </p:cNvPicPr>
+          <p:nvPr/>
+        </p:nvPicPr>
+        <p:blipFill>
+          <a:blip r:embed="rId3" cstate="print">
+            <a:extLst>
+              <a:ext uri="{28A0092B-C50C-407E-A947-70E740481C1C}">
+                <a14:useLocalDpi xmlns:a14="http://schemas.microsoft.com/office/drawing/2010/main" val="0"/>
+              </a:ext>
+            </a:extLst>
+          </a:blip>
+          <a:stretch>
+            <a:fillRect/>
+          </a:stretch>
+        </p:blipFill>
+        <p:spPr>
+          <a:xfrm>
+            <a:off x="5436293" y="1486573"/>
+            <a:ext cx="3509415" cy="2535192"/>
+          </a:xfrm>
+          <a:prstGeom prst="rect">
+            <a:avLst/>
+          </a:prstGeom>
+        </p:spPr>
+      </p:pic>
+      <p:pic>
+        <p:nvPicPr>
+          <p:cNvPr id="8" name="Picture 7"/>
+          <p:cNvPicPr>
+            <a:picLocks noChangeAspect="1"/>
+          </p:cNvPicPr>
+          <p:nvPr/>
+        </p:nvPicPr>
+        <p:blipFill>
+          <a:blip r:embed="rId4">
+            <a:extLst>
+              <a:ext uri="{28A0092B-C50C-407E-A947-70E740481C1C}">
+                <a14:useLocalDpi xmlns:a14="http://schemas.microsoft.com/office/drawing/2010/main" val="0"/>
+              </a:ext>
+            </a:extLst>
+          </a:blip>
+          <a:stretch>
+            <a:fillRect/>
+          </a:stretch>
+        </p:blipFill>
+        <p:spPr>
+          <a:xfrm>
+            <a:off x="255180" y="1488558"/>
+            <a:ext cx="4503479" cy="2533207"/>
+          </a:xfrm>
+          <a:prstGeom prst="rect">
+            <a:avLst/>
+          </a:prstGeom>
+        </p:spPr>
+      </p:pic>
     </p:spTree>
     <p:extLst>
       <p:ext uri="{BB962C8B-B14F-4D97-AF65-F5344CB8AC3E}">
@@ -5045,6 +5897,13 @@
       <p:transition spd="slow"/>
     </mc:Fallback>
   </mc:AlternateContent>
+  <p:timing>
+    <p:tnLst>
+      <p:par>
+        <p:cTn id="1" dur="indefinite" restart="never" nodeType="tmRoot"/>
+      </p:par>
+    </p:tnLst>
+  </p:timing>
 </p:sld>
 </file>
 

</xml_diff>